<commit_message>
some small changes to the presentation
</commit_message>
<xml_diff>
--- a/presentation/LAK Dataset Visualization - v2.pptx
+++ b/presentation/LAK Dataset Visualization - v2.pptx
@@ -204,6 +204,7 @@
           <a:p>
             <a:fld id="{E43CAC32-9666-49E6-8E26-32B4394C868D}" type="datetimeFigureOut">
               <a:rPr lang="en-US" smtClean="0"/>
+              <a:pPr/>
               <a:t>5/20/2013</a:t>
             </a:fld>
             <a:endParaRPr lang="en-US"/>
@@ -363,7 +364,8 @@
           <a:p>
             <a:fld id="{C28FCC00-BE90-43A8-BE8B-860A794310F9}" type="slidenum">
               <a:rPr lang="en-US" smtClean="0"/>
-              <a:t>‹#›</a:t>
+              <a:pPr/>
+              <a:t>‹nr.›</a:t>
             </a:fld>
             <a:endParaRPr lang="en-US"/>
           </a:p>
@@ -372,7 +374,7 @@
     </p:spTree>
     <p:extLst>
       <p:ext uri="{BB962C8B-B14F-4D97-AF65-F5344CB8AC3E}">
-        <p14:creationId xmlns:p14="http://schemas.microsoft.com/office/powerpoint/2010/main" val="476566289"/>
+        <p14:creationId xmlns:p14="http://schemas.microsoft.com/office/powerpoint/2010/main" xmlns="" val="476566289"/>
       </p:ext>
     </p:extLst>
   </p:cSld>
@@ -588,6 +590,7 @@
           <a:p>
             <a:fld id="{C28FCC00-BE90-43A8-BE8B-860A794310F9}" type="slidenum">
               <a:rPr lang="en-US" smtClean="0"/>
+              <a:pPr/>
               <a:t>4</a:t>
             </a:fld>
             <a:endParaRPr lang="en-US"/>
@@ -597,7 +600,7 @@
     </p:spTree>
     <p:extLst>
       <p:ext uri="{BB962C8B-B14F-4D97-AF65-F5344CB8AC3E}">
-        <p14:creationId xmlns:p14="http://schemas.microsoft.com/office/powerpoint/2010/main" val="234455060"/>
+        <p14:creationId xmlns:p14="http://schemas.microsoft.com/office/powerpoint/2010/main" xmlns="" val="234455060"/>
       </p:ext>
     </p:extLst>
   </p:cSld>
@@ -736,6 +739,7 @@
           <a:p>
             <a:fld id="{C28FCC00-BE90-43A8-BE8B-860A794310F9}" type="slidenum">
               <a:rPr lang="en-US" smtClean="0"/>
+              <a:pPr/>
               <a:t>5</a:t>
             </a:fld>
             <a:endParaRPr lang="en-US"/>
@@ -745,7 +749,7 @@
     </p:spTree>
     <p:extLst>
       <p:ext uri="{BB962C8B-B14F-4D97-AF65-F5344CB8AC3E}">
-        <p14:creationId xmlns:p14="http://schemas.microsoft.com/office/powerpoint/2010/main" val="130345716"/>
+        <p14:creationId xmlns:p14="http://schemas.microsoft.com/office/powerpoint/2010/main" xmlns="" val="130345716"/>
       </p:ext>
     </p:extLst>
   </p:cSld>
@@ -936,6 +940,7 @@
           <a:p>
             <a:fld id="{ED02DD9D-C3CB-4C5D-8462-3DEFE68BBCFA}" type="datetimeFigureOut">
               <a:rPr lang="en-US" smtClean="0"/>
+              <a:pPr/>
               <a:t>5/20/2013</a:t>
             </a:fld>
             <a:endParaRPr lang="en-US"/>
@@ -978,7 +983,8 @@
           <a:p>
             <a:fld id="{0230D600-730D-4587-B172-6641A099CD8E}" type="slidenum">
               <a:rPr lang="en-US" smtClean="0"/>
-              <a:t>‹#›</a:t>
+              <a:pPr/>
+              <a:t>‹nr.›</a:t>
             </a:fld>
             <a:endParaRPr lang="en-US"/>
           </a:p>
@@ -987,7 +993,7 @@
     </p:spTree>
     <p:extLst>
       <p:ext uri="{BB962C8B-B14F-4D97-AF65-F5344CB8AC3E}">
-        <p14:creationId xmlns:p14="http://schemas.microsoft.com/office/powerpoint/2010/main" val="1991621647"/>
+        <p14:creationId xmlns:p14="http://schemas.microsoft.com/office/powerpoint/2010/main" xmlns="" val="1991621647"/>
       </p:ext>
     </p:extLst>
   </p:cSld>
@@ -1106,6 +1112,7 @@
           <a:p>
             <a:fld id="{ED02DD9D-C3CB-4C5D-8462-3DEFE68BBCFA}" type="datetimeFigureOut">
               <a:rPr lang="en-US" smtClean="0"/>
+              <a:pPr/>
               <a:t>5/20/2013</a:t>
             </a:fld>
             <a:endParaRPr lang="en-US"/>
@@ -1148,7 +1155,8 @@
           <a:p>
             <a:fld id="{0230D600-730D-4587-B172-6641A099CD8E}" type="slidenum">
               <a:rPr lang="en-US" smtClean="0"/>
-              <a:t>‹#›</a:t>
+              <a:pPr/>
+              <a:t>‹nr.›</a:t>
             </a:fld>
             <a:endParaRPr lang="en-US"/>
           </a:p>
@@ -1157,7 +1165,7 @@
     </p:spTree>
     <p:extLst>
       <p:ext uri="{BB962C8B-B14F-4D97-AF65-F5344CB8AC3E}">
-        <p14:creationId xmlns:p14="http://schemas.microsoft.com/office/powerpoint/2010/main" val="2011108903"/>
+        <p14:creationId xmlns:p14="http://schemas.microsoft.com/office/powerpoint/2010/main" xmlns="" val="2011108903"/>
       </p:ext>
     </p:extLst>
   </p:cSld>
@@ -1286,6 +1294,7 @@
           <a:p>
             <a:fld id="{ED02DD9D-C3CB-4C5D-8462-3DEFE68BBCFA}" type="datetimeFigureOut">
               <a:rPr lang="en-US" smtClean="0"/>
+              <a:pPr/>
               <a:t>5/20/2013</a:t>
             </a:fld>
             <a:endParaRPr lang="en-US"/>
@@ -1328,7 +1337,8 @@
           <a:p>
             <a:fld id="{0230D600-730D-4587-B172-6641A099CD8E}" type="slidenum">
               <a:rPr lang="en-US" smtClean="0"/>
-              <a:t>‹#›</a:t>
+              <a:pPr/>
+              <a:t>‹nr.›</a:t>
             </a:fld>
             <a:endParaRPr lang="en-US"/>
           </a:p>
@@ -1337,7 +1347,7 @@
     </p:spTree>
     <p:extLst>
       <p:ext uri="{BB962C8B-B14F-4D97-AF65-F5344CB8AC3E}">
-        <p14:creationId xmlns:p14="http://schemas.microsoft.com/office/powerpoint/2010/main" val="2728416370"/>
+        <p14:creationId xmlns:p14="http://schemas.microsoft.com/office/powerpoint/2010/main" xmlns="" val="2728416370"/>
       </p:ext>
     </p:extLst>
   </p:cSld>
@@ -1456,6 +1466,7 @@
           <a:p>
             <a:fld id="{ED02DD9D-C3CB-4C5D-8462-3DEFE68BBCFA}" type="datetimeFigureOut">
               <a:rPr lang="en-US" smtClean="0"/>
+              <a:pPr/>
               <a:t>5/20/2013</a:t>
             </a:fld>
             <a:endParaRPr lang="en-US"/>
@@ -1498,7 +1509,8 @@
           <a:p>
             <a:fld id="{0230D600-730D-4587-B172-6641A099CD8E}" type="slidenum">
               <a:rPr lang="en-US" smtClean="0"/>
-              <a:t>‹#›</a:t>
+              <a:pPr/>
+              <a:t>‹nr.›</a:t>
             </a:fld>
             <a:endParaRPr lang="en-US"/>
           </a:p>
@@ -1507,7 +1519,7 @@
     </p:spTree>
     <p:extLst>
       <p:ext uri="{BB962C8B-B14F-4D97-AF65-F5344CB8AC3E}">
-        <p14:creationId xmlns:p14="http://schemas.microsoft.com/office/powerpoint/2010/main" val="528057498"/>
+        <p14:creationId xmlns:p14="http://schemas.microsoft.com/office/powerpoint/2010/main" xmlns="" val="528057498"/>
       </p:ext>
     </p:extLst>
   </p:cSld>
@@ -1702,6 +1714,7 @@
           <a:p>
             <a:fld id="{ED02DD9D-C3CB-4C5D-8462-3DEFE68BBCFA}" type="datetimeFigureOut">
               <a:rPr lang="en-US" smtClean="0"/>
+              <a:pPr/>
               <a:t>5/20/2013</a:t>
             </a:fld>
             <a:endParaRPr lang="en-US"/>
@@ -1744,7 +1757,8 @@
           <a:p>
             <a:fld id="{0230D600-730D-4587-B172-6641A099CD8E}" type="slidenum">
               <a:rPr lang="en-US" smtClean="0"/>
-              <a:t>‹#›</a:t>
+              <a:pPr/>
+              <a:t>‹nr.›</a:t>
             </a:fld>
             <a:endParaRPr lang="en-US"/>
           </a:p>
@@ -1753,7 +1767,7 @@
     </p:spTree>
     <p:extLst>
       <p:ext uri="{BB962C8B-B14F-4D97-AF65-F5344CB8AC3E}">
-        <p14:creationId xmlns:p14="http://schemas.microsoft.com/office/powerpoint/2010/main" val="2370346862"/>
+        <p14:creationId xmlns:p14="http://schemas.microsoft.com/office/powerpoint/2010/main" xmlns="" val="2370346862"/>
       </p:ext>
     </p:extLst>
   </p:cSld>
@@ -1990,6 +2004,7 @@
           <a:p>
             <a:fld id="{ED02DD9D-C3CB-4C5D-8462-3DEFE68BBCFA}" type="datetimeFigureOut">
               <a:rPr lang="en-US" smtClean="0"/>
+              <a:pPr/>
               <a:t>5/20/2013</a:t>
             </a:fld>
             <a:endParaRPr lang="en-US"/>
@@ -2032,7 +2047,8 @@
           <a:p>
             <a:fld id="{0230D600-730D-4587-B172-6641A099CD8E}" type="slidenum">
               <a:rPr lang="en-US" smtClean="0"/>
-              <a:t>‹#›</a:t>
+              <a:pPr/>
+              <a:t>‹nr.›</a:t>
             </a:fld>
             <a:endParaRPr lang="en-US"/>
           </a:p>
@@ -2041,7 +2057,7 @@
     </p:spTree>
     <p:extLst>
       <p:ext uri="{BB962C8B-B14F-4D97-AF65-F5344CB8AC3E}">
-        <p14:creationId xmlns:p14="http://schemas.microsoft.com/office/powerpoint/2010/main" val="2795977544"/>
+        <p14:creationId xmlns:p14="http://schemas.microsoft.com/office/powerpoint/2010/main" xmlns="" val="2795977544"/>
       </p:ext>
     </p:extLst>
   </p:cSld>
@@ -2412,6 +2428,7 @@
           <a:p>
             <a:fld id="{ED02DD9D-C3CB-4C5D-8462-3DEFE68BBCFA}" type="datetimeFigureOut">
               <a:rPr lang="en-US" smtClean="0"/>
+              <a:pPr/>
               <a:t>5/20/2013</a:t>
             </a:fld>
             <a:endParaRPr lang="en-US"/>
@@ -2454,7 +2471,8 @@
           <a:p>
             <a:fld id="{0230D600-730D-4587-B172-6641A099CD8E}" type="slidenum">
               <a:rPr lang="en-US" smtClean="0"/>
-              <a:t>‹#›</a:t>
+              <a:pPr/>
+              <a:t>‹nr.›</a:t>
             </a:fld>
             <a:endParaRPr lang="en-US"/>
           </a:p>
@@ -2463,7 +2481,7 @@
     </p:spTree>
     <p:extLst>
       <p:ext uri="{BB962C8B-B14F-4D97-AF65-F5344CB8AC3E}">
-        <p14:creationId xmlns:p14="http://schemas.microsoft.com/office/powerpoint/2010/main" val="1434580930"/>
+        <p14:creationId xmlns:p14="http://schemas.microsoft.com/office/powerpoint/2010/main" xmlns="" val="1434580930"/>
       </p:ext>
     </p:extLst>
   </p:cSld>
@@ -2530,6 +2548,7 @@
           <a:p>
             <a:fld id="{ED02DD9D-C3CB-4C5D-8462-3DEFE68BBCFA}" type="datetimeFigureOut">
               <a:rPr lang="en-US" smtClean="0"/>
+              <a:pPr/>
               <a:t>5/20/2013</a:t>
             </a:fld>
             <a:endParaRPr lang="en-US"/>
@@ -2572,7 +2591,8 @@
           <a:p>
             <a:fld id="{0230D600-730D-4587-B172-6641A099CD8E}" type="slidenum">
               <a:rPr lang="en-US" smtClean="0"/>
-              <a:t>‹#›</a:t>
+              <a:pPr/>
+              <a:t>‹nr.›</a:t>
             </a:fld>
             <a:endParaRPr lang="en-US"/>
           </a:p>
@@ -2581,7 +2601,7 @@
     </p:spTree>
     <p:extLst>
       <p:ext uri="{BB962C8B-B14F-4D97-AF65-F5344CB8AC3E}">
-        <p14:creationId xmlns:p14="http://schemas.microsoft.com/office/powerpoint/2010/main" val="3970465546"/>
+        <p14:creationId xmlns:p14="http://schemas.microsoft.com/office/powerpoint/2010/main" xmlns="" val="3970465546"/>
       </p:ext>
     </p:extLst>
   </p:cSld>
@@ -2625,6 +2645,7 @@
           <a:p>
             <a:fld id="{ED02DD9D-C3CB-4C5D-8462-3DEFE68BBCFA}" type="datetimeFigureOut">
               <a:rPr lang="en-US" smtClean="0"/>
+              <a:pPr/>
               <a:t>5/20/2013</a:t>
             </a:fld>
             <a:endParaRPr lang="en-US"/>
@@ -2667,7 +2688,8 @@
           <a:p>
             <a:fld id="{0230D600-730D-4587-B172-6641A099CD8E}" type="slidenum">
               <a:rPr lang="en-US" smtClean="0"/>
-              <a:t>‹#›</a:t>
+              <a:pPr/>
+              <a:t>‹nr.›</a:t>
             </a:fld>
             <a:endParaRPr lang="en-US"/>
           </a:p>
@@ -2676,7 +2698,7 @@
     </p:spTree>
     <p:extLst>
       <p:ext uri="{BB962C8B-B14F-4D97-AF65-F5344CB8AC3E}">
-        <p14:creationId xmlns:p14="http://schemas.microsoft.com/office/powerpoint/2010/main" val="3891936300"/>
+        <p14:creationId xmlns:p14="http://schemas.microsoft.com/office/powerpoint/2010/main" xmlns="" val="3891936300"/>
       </p:ext>
     </p:extLst>
   </p:cSld>
@@ -2902,6 +2924,7 @@
           <a:p>
             <a:fld id="{ED02DD9D-C3CB-4C5D-8462-3DEFE68BBCFA}" type="datetimeFigureOut">
               <a:rPr lang="en-US" smtClean="0"/>
+              <a:pPr/>
               <a:t>5/20/2013</a:t>
             </a:fld>
             <a:endParaRPr lang="en-US"/>
@@ -2944,7 +2967,8 @@
           <a:p>
             <a:fld id="{0230D600-730D-4587-B172-6641A099CD8E}" type="slidenum">
               <a:rPr lang="en-US" smtClean="0"/>
-              <a:t>‹#›</a:t>
+              <a:pPr/>
+              <a:t>‹nr.›</a:t>
             </a:fld>
             <a:endParaRPr lang="en-US"/>
           </a:p>
@@ -2953,7 +2977,7 @@
     </p:spTree>
     <p:extLst>
       <p:ext uri="{BB962C8B-B14F-4D97-AF65-F5344CB8AC3E}">
-        <p14:creationId xmlns:p14="http://schemas.microsoft.com/office/powerpoint/2010/main" val="2949125007"/>
+        <p14:creationId xmlns:p14="http://schemas.microsoft.com/office/powerpoint/2010/main" xmlns="" val="2949125007"/>
       </p:ext>
     </p:extLst>
   </p:cSld>
@@ -3155,6 +3179,7 @@
           <a:p>
             <a:fld id="{ED02DD9D-C3CB-4C5D-8462-3DEFE68BBCFA}" type="datetimeFigureOut">
               <a:rPr lang="en-US" smtClean="0"/>
+              <a:pPr/>
               <a:t>5/20/2013</a:t>
             </a:fld>
             <a:endParaRPr lang="en-US"/>
@@ -3197,7 +3222,8 @@
           <a:p>
             <a:fld id="{0230D600-730D-4587-B172-6641A099CD8E}" type="slidenum">
               <a:rPr lang="en-US" smtClean="0"/>
-              <a:t>‹#›</a:t>
+              <a:pPr/>
+              <a:t>‹nr.›</a:t>
             </a:fld>
             <a:endParaRPr lang="en-US"/>
           </a:p>
@@ -3206,7 +3232,7 @@
     </p:spTree>
     <p:extLst>
       <p:ext uri="{BB962C8B-B14F-4D97-AF65-F5344CB8AC3E}">
-        <p14:creationId xmlns:p14="http://schemas.microsoft.com/office/powerpoint/2010/main" val="1068751909"/>
+        <p14:creationId xmlns:p14="http://schemas.microsoft.com/office/powerpoint/2010/main" xmlns="" val="1068751909"/>
       </p:ext>
     </p:extLst>
   </p:cSld>
@@ -3368,6 +3394,7 @@
           <a:p>
             <a:fld id="{ED02DD9D-C3CB-4C5D-8462-3DEFE68BBCFA}" type="datetimeFigureOut">
               <a:rPr lang="en-US" smtClean="0"/>
+              <a:pPr/>
               <a:t>5/20/2013</a:t>
             </a:fld>
             <a:endParaRPr lang="en-US"/>
@@ -3446,7 +3473,8 @@
           <a:p>
             <a:fld id="{0230D600-730D-4587-B172-6641A099CD8E}" type="slidenum">
               <a:rPr lang="en-US" smtClean="0"/>
-              <a:t>‹#›</a:t>
+              <a:pPr/>
+              <a:t>‹nr.›</a:t>
             </a:fld>
             <a:endParaRPr lang="en-US"/>
           </a:p>
@@ -3455,7 +3483,7 @@
     </p:spTree>
     <p:extLst>
       <p:ext uri="{BB962C8B-B14F-4D97-AF65-F5344CB8AC3E}">
-        <p14:creationId xmlns:p14="http://schemas.microsoft.com/office/powerpoint/2010/main" val="1722780671"/>
+        <p14:creationId xmlns:p14="http://schemas.microsoft.com/office/powerpoint/2010/main" xmlns="" val="1722780671"/>
       </p:ext>
     </p:extLst>
   </p:cSld>
@@ -3841,7 +3869,7 @@
           <a:blip r:embed="rId2" cstate="print">
             <a:extLst>
               <a:ext uri="{28A0092B-C50C-407E-A947-70E740481C1C}">
-                <a14:useLocalDpi xmlns:a14="http://schemas.microsoft.com/office/drawing/2010/main" val="0"/>
+                <a14:useLocalDpi xmlns:a14="http://schemas.microsoft.com/office/drawing/2010/main" xmlns="" val="0"/>
               </a:ext>
             </a:extLst>
           </a:blip>
@@ -3865,14 +3893,14 @@
           <a:effectLst/>
           <a:extLst>
             <a:ext uri="{909E8E84-426E-40DD-AFC4-6F175D3DCCD1}">
-              <a14:hiddenFill xmlns:a14="http://schemas.microsoft.com/office/drawing/2010/main">
+              <a14:hiddenFill xmlns:a14="http://schemas.microsoft.com/office/drawing/2010/main" xmlns="">
                 <a:solidFill>
                   <a:schemeClr val="accent1"/>
                 </a:solidFill>
               </a14:hiddenFill>
             </a:ext>
             <a:ext uri="{91240B29-F687-4F45-9708-019B960494DF}">
-              <a14:hiddenLine xmlns:a14="http://schemas.microsoft.com/office/drawing/2010/main" w="9525">
+              <a14:hiddenLine xmlns:a14="http://schemas.microsoft.com/office/drawing/2010/main" xmlns="" w="9525">
                 <a:solidFill>
                   <a:schemeClr val="tx1"/>
                 </a:solidFill>
@@ -3882,7 +3910,7 @@
               </a14:hiddenLine>
             </a:ext>
             <a:ext uri="{AF507438-7753-43E0-B8FC-AC1667EBCBE1}">
-              <a14:hiddenEffects xmlns:a14="http://schemas.microsoft.com/office/drawing/2010/main">
+              <a14:hiddenEffects xmlns:a14="http://schemas.microsoft.com/office/drawing/2010/main" xmlns="">
                 <a:effectLst>
                   <a:outerShdw dist="35921" dir="2700000" algn="ctr" rotWithShape="0">
                     <a:schemeClr val="bg2"/>
@@ -3905,7 +3933,7 @@
           <a:blip r:embed="rId3" cstate="print">
             <a:extLst>
               <a:ext uri="{28A0092B-C50C-407E-A947-70E740481C1C}">
-                <a14:useLocalDpi xmlns:a14="http://schemas.microsoft.com/office/drawing/2010/main" val="0"/>
+                <a14:useLocalDpi xmlns:a14="http://schemas.microsoft.com/office/drawing/2010/main" xmlns="" val="0"/>
               </a:ext>
             </a:extLst>
           </a:blip>
@@ -3929,14 +3957,14 @@
           <a:effectLst/>
           <a:extLst>
             <a:ext uri="{909E8E84-426E-40DD-AFC4-6F175D3DCCD1}">
-              <a14:hiddenFill xmlns:a14="http://schemas.microsoft.com/office/drawing/2010/main">
+              <a14:hiddenFill xmlns:a14="http://schemas.microsoft.com/office/drawing/2010/main" xmlns="">
                 <a:solidFill>
                   <a:schemeClr val="accent1"/>
                 </a:solidFill>
               </a14:hiddenFill>
             </a:ext>
             <a:ext uri="{91240B29-F687-4F45-9708-019B960494DF}">
-              <a14:hiddenLine xmlns:a14="http://schemas.microsoft.com/office/drawing/2010/main" w="9525">
+              <a14:hiddenLine xmlns:a14="http://schemas.microsoft.com/office/drawing/2010/main" xmlns="" w="9525">
                 <a:solidFill>
                   <a:schemeClr val="tx1"/>
                 </a:solidFill>
@@ -3946,7 +3974,7 @@
               </a14:hiddenLine>
             </a:ext>
             <a:ext uri="{AF507438-7753-43E0-B8FC-AC1667EBCBE1}">
-              <a14:hiddenEffects xmlns:a14="http://schemas.microsoft.com/office/drawing/2010/main">
+              <a14:hiddenEffects xmlns:a14="http://schemas.microsoft.com/office/drawing/2010/main" xmlns="">
                 <a:effectLst>
                   <a:outerShdw dist="35921" dir="2700000" algn="ctr" rotWithShape="0">
                     <a:schemeClr val="bg2"/>
@@ -3969,7 +3997,7 @@
           <a:blip r:embed="rId4" cstate="print">
             <a:extLst>
               <a:ext uri="{28A0092B-C50C-407E-A947-70E740481C1C}">
-                <a14:useLocalDpi xmlns:a14="http://schemas.microsoft.com/office/drawing/2010/main" val="0"/>
+                <a14:useLocalDpi xmlns:a14="http://schemas.microsoft.com/office/drawing/2010/main" xmlns="" val="0"/>
               </a:ext>
             </a:extLst>
           </a:blip>
@@ -3993,14 +4021,14 @@
           <a:effectLst/>
           <a:extLst>
             <a:ext uri="{909E8E84-426E-40DD-AFC4-6F175D3DCCD1}">
-              <a14:hiddenFill xmlns:a14="http://schemas.microsoft.com/office/drawing/2010/main">
+              <a14:hiddenFill xmlns:a14="http://schemas.microsoft.com/office/drawing/2010/main" xmlns="">
                 <a:solidFill>
                   <a:schemeClr val="accent1"/>
                 </a:solidFill>
               </a14:hiddenFill>
             </a:ext>
             <a:ext uri="{91240B29-F687-4F45-9708-019B960494DF}">
-              <a14:hiddenLine xmlns:a14="http://schemas.microsoft.com/office/drawing/2010/main" w="9525">
+              <a14:hiddenLine xmlns:a14="http://schemas.microsoft.com/office/drawing/2010/main" xmlns="" w="9525">
                 <a:solidFill>
                   <a:schemeClr val="tx1"/>
                 </a:solidFill>
@@ -4010,7 +4038,7 @@
               </a14:hiddenLine>
             </a:ext>
             <a:ext uri="{AF507438-7753-43E0-B8FC-AC1667EBCBE1}">
-              <a14:hiddenEffects xmlns:a14="http://schemas.microsoft.com/office/drawing/2010/main">
+              <a14:hiddenEffects xmlns:a14="http://schemas.microsoft.com/office/drawing/2010/main" xmlns="">
                 <a:effectLst>
                   <a:outerShdw dist="35921" dir="2700000" algn="ctr" rotWithShape="0">
                     <a:schemeClr val="bg2"/>
@@ -4024,7 +4052,7 @@
     </p:spTree>
     <p:extLst>
       <p:ext uri="{BB962C8B-B14F-4D97-AF65-F5344CB8AC3E}">
-        <p14:creationId xmlns:p14="http://schemas.microsoft.com/office/powerpoint/2010/main" val="2600589044"/>
+        <p14:creationId xmlns:p14="http://schemas.microsoft.com/office/powerpoint/2010/main" xmlns="" val="2600589044"/>
       </p:ext>
     </p:extLst>
   </p:cSld>
@@ -4131,11 +4159,7 @@
             </a:r>
             <a:r>
               <a:rPr lang="en-US" dirty="0" smtClean="0"/>
-              <a:t> are </a:t>
-            </a:r>
-            <a:r>
-              <a:rPr lang="en-US" dirty="0" smtClean="0"/>
-              <a:t>highlighted</a:t>
+              <a:t> are highlighted</a:t>
             </a:r>
           </a:p>
           <a:p>
@@ -4155,10 +4179,10 @@
           <p:nvPr/>
         </p:nvPicPr>
         <p:blipFill>
-          <a:blip r:embed="rId2">
+          <a:blip r:embed="rId2" cstate="print">
             <a:extLst>
               <a:ext uri="{28A0092B-C50C-407E-A947-70E740481C1C}">
-                <a14:useLocalDpi xmlns:a14="http://schemas.microsoft.com/office/drawing/2010/main" val="0"/>
+                <a14:useLocalDpi xmlns:a14="http://schemas.microsoft.com/office/drawing/2010/main" xmlns="" val="0"/>
               </a:ext>
             </a:extLst>
           </a:blip>
@@ -4182,14 +4206,14 @@
           <a:effectLst/>
           <a:extLst>
             <a:ext uri="{909E8E84-426E-40DD-AFC4-6F175D3DCCD1}">
-              <a14:hiddenFill xmlns:a14="http://schemas.microsoft.com/office/drawing/2010/main">
+              <a14:hiddenFill xmlns:a14="http://schemas.microsoft.com/office/drawing/2010/main" xmlns="">
                 <a:solidFill>
                   <a:schemeClr val="accent1"/>
                 </a:solidFill>
               </a14:hiddenFill>
             </a:ext>
             <a:ext uri="{91240B29-F687-4F45-9708-019B960494DF}">
-              <a14:hiddenLine xmlns:a14="http://schemas.microsoft.com/office/drawing/2010/main" w="9525">
+              <a14:hiddenLine xmlns:a14="http://schemas.microsoft.com/office/drawing/2010/main" xmlns="" w="9525">
                 <a:solidFill>
                   <a:schemeClr val="tx1"/>
                 </a:solidFill>
@@ -4199,7 +4223,7 @@
               </a14:hiddenLine>
             </a:ext>
             <a:ext uri="{AF507438-7753-43E0-B8FC-AC1667EBCBE1}">
-              <a14:hiddenEffects xmlns:a14="http://schemas.microsoft.com/office/drawing/2010/main">
+              <a14:hiddenEffects xmlns:a14="http://schemas.microsoft.com/office/drawing/2010/main" xmlns="">
                 <a:effectLst>
                   <a:outerShdw dist="35921" dir="2700000" algn="ctr" rotWithShape="0">
                     <a:schemeClr val="bg2"/>
@@ -4222,7 +4246,7 @@
           <a:blip r:embed="rId3" cstate="print">
             <a:extLst>
               <a:ext uri="{28A0092B-C50C-407E-A947-70E740481C1C}">
-                <a14:useLocalDpi xmlns:a14="http://schemas.microsoft.com/office/drawing/2010/main" val="0"/>
+                <a14:useLocalDpi xmlns:a14="http://schemas.microsoft.com/office/drawing/2010/main" xmlns="" val="0"/>
               </a:ext>
             </a:extLst>
           </a:blip>
@@ -4244,14 +4268,14 @@
           <a:effectLst/>
           <a:extLst>
             <a:ext uri="{909E8E84-426E-40DD-AFC4-6F175D3DCCD1}">
-              <a14:hiddenFill xmlns:a14="http://schemas.microsoft.com/office/drawing/2010/main">
+              <a14:hiddenFill xmlns:a14="http://schemas.microsoft.com/office/drawing/2010/main" xmlns="">
                 <a:solidFill>
                   <a:schemeClr val="accent1"/>
                 </a:solidFill>
               </a14:hiddenFill>
             </a:ext>
             <a:ext uri="{91240B29-F687-4F45-9708-019B960494DF}">
-              <a14:hiddenLine xmlns:a14="http://schemas.microsoft.com/office/drawing/2010/main" w="9525">
+              <a14:hiddenLine xmlns:a14="http://schemas.microsoft.com/office/drawing/2010/main" xmlns="" w="9525">
                 <a:solidFill>
                   <a:schemeClr val="tx1"/>
                 </a:solidFill>
@@ -4261,7 +4285,7 @@
               </a14:hiddenLine>
             </a:ext>
             <a:ext uri="{AF507438-7753-43E0-B8FC-AC1667EBCBE1}">
-              <a14:hiddenEffects xmlns:a14="http://schemas.microsoft.com/office/drawing/2010/main">
+              <a14:hiddenEffects xmlns:a14="http://schemas.microsoft.com/office/drawing/2010/main" xmlns="">
                 <a:effectLst>
                   <a:outerShdw dist="35921" dir="2700000" algn="ctr" rotWithShape="0">
                     <a:schemeClr val="bg2"/>
@@ -4344,10 +4368,10 @@
           <p:nvPr/>
         </p:nvPicPr>
         <p:blipFill>
-          <a:blip r:embed="rId4">
+          <a:blip r:embed="rId4" cstate="print">
             <a:extLst>
               <a:ext uri="{28A0092B-C50C-407E-A947-70E740481C1C}">
-                <a14:useLocalDpi xmlns:a14="http://schemas.microsoft.com/office/drawing/2010/main" val="0"/>
+                <a14:useLocalDpi xmlns:a14="http://schemas.microsoft.com/office/drawing/2010/main" xmlns="" val="0"/>
               </a:ext>
             </a:extLst>
           </a:blip>
@@ -4371,14 +4395,14 @@
           <a:effectLst/>
           <a:extLst>
             <a:ext uri="{909E8E84-426E-40DD-AFC4-6F175D3DCCD1}">
-              <a14:hiddenFill xmlns:a14="http://schemas.microsoft.com/office/drawing/2010/main">
+              <a14:hiddenFill xmlns:a14="http://schemas.microsoft.com/office/drawing/2010/main" xmlns="">
                 <a:solidFill>
                   <a:schemeClr val="accent1"/>
                 </a:solidFill>
               </a14:hiddenFill>
             </a:ext>
             <a:ext uri="{91240B29-F687-4F45-9708-019B960494DF}">
-              <a14:hiddenLine xmlns:a14="http://schemas.microsoft.com/office/drawing/2010/main" w="9525">
+              <a14:hiddenLine xmlns:a14="http://schemas.microsoft.com/office/drawing/2010/main" xmlns="" w="9525">
                 <a:solidFill>
                   <a:schemeClr val="tx1"/>
                 </a:solidFill>
@@ -4388,7 +4412,7 @@
               </a14:hiddenLine>
             </a:ext>
             <a:ext uri="{AF507438-7753-43E0-B8FC-AC1667EBCBE1}">
-              <a14:hiddenEffects xmlns:a14="http://schemas.microsoft.com/office/drawing/2010/main">
+              <a14:hiddenEffects xmlns:a14="http://schemas.microsoft.com/office/drawing/2010/main" xmlns="">
                 <a:effectLst>
                   <a:outerShdw dist="35921" dir="2700000" algn="ctr" rotWithShape="0">
                     <a:schemeClr val="bg2"/>
@@ -4402,7 +4426,7 @@
     </p:spTree>
     <p:extLst>
       <p:ext uri="{BB962C8B-B14F-4D97-AF65-F5344CB8AC3E}">
-        <p14:creationId xmlns:p14="http://schemas.microsoft.com/office/powerpoint/2010/main" val="3235389205"/>
+        <p14:creationId xmlns:p14="http://schemas.microsoft.com/office/powerpoint/2010/main" xmlns="" val="3235389205"/>
       </p:ext>
     </p:extLst>
   </p:cSld>
@@ -4461,10 +4485,10 @@
           <p:nvPr/>
         </p:nvPicPr>
         <p:blipFill>
-          <a:blip r:embed="rId2">
+          <a:blip r:embed="rId2" cstate="print">
             <a:extLst>
               <a:ext uri="{28A0092B-C50C-407E-A947-70E740481C1C}">
-                <a14:useLocalDpi xmlns:a14="http://schemas.microsoft.com/office/drawing/2010/main" val="0"/>
+                <a14:useLocalDpi xmlns:a14="http://schemas.microsoft.com/office/drawing/2010/main" xmlns="" val="0"/>
               </a:ext>
             </a:extLst>
           </a:blip>
@@ -4488,14 +4512,14 @@
           <a:effectLst/>
           <a:extLst>
             <a:ext uri="{909E8E84-426E-40DD-AFC4-6F175D3DCCD1}">
-              <a14:hiddenFill xmlns:a14="http://schemas.microsoft.com/office/drawing/2010/main">
+              <a14:hiddenFill xmlns:a14="http://schemas.microsoft.com/office/drawing/2010/main" xmlns="">
                 <a:solidFill>
                   <a:schemeClr val="accent1"/>
                 </a:solidFill>
               </a14:hiddenFill>
             </a:ext>
             <a:ext uri="{91240B29-F687-4F45-9708-019B960494DF}">
-              <a14:hiddenLine xmlns:a14="http://schemas.microsoft.com/office/drawing/2010/main" w="9525">
+              <a14:hiddenLine xmlns:a14="http://schemas.microsoft.com/office/drawing/2010/main" xmlns="" w="9525">
                 <a:solidFill>
                   <a:schemeClr val="tx1"/>
                 </a:solidFill>
@@ -4505,7 +4529,7 @@
               </a14:hiddenLine>
             </a:ext>
             <a:ext uri="{AF507438-7753-43E0-B8FC-AC1667EBCBE1}">
-              <a14:hiddenEffects xmlns:a14="http://schemas.microsoft.com/office/drawing/2010/main">
+              <a14:hiddenEffects xmlns:a14="http://schemas.microsoft.com/office/drawing/2010/main" xmlns="">
                 <a:effectLst>
                   <a:outerShdw dist="35921" dir="2700000" algn="ctr" rotWithShape="0">
                     <a:schemeClr val="bg2"/>
@@ -4528,7 +4552,7 @@
           <a:blip r:embed="rId3" cstate="print">
             <a:extLst>
               <a:ext uri="{28A0092B-C50C-407E-A947-70E740481C1C}">
-                <a14:useLocalDpi xmlns:a14="http://schemas.microsoft.com/office/drawing/2010/main" val="0"/>
+                <a14:useLocalDpi xmlns:a14="http://schemas.microsoft.com/office/drawing/2010/main" xmlns="" val="0"/>
               </a:ext>
             </a:extLst>
           </a:blip>
@@ -4552,14 +4576,14 @@
           <a:effectLst/>
           <a:extLst>
             <a:ext uri="{909E8E84-426E-40DD-AFC4-6F175D3DCCD1}">
-              <a14:hiddenFill xmlns:a14="http://schemas.microsoft.com/office/drawing/2010/main">
+              <a14:hiddenFill xmlns:a14="http://schemas.microsoft.com/office/drawing/2010/main" xmlns="">
                 <a:solidFill>
                   <a:schemeClr val="accent1"/>
                 </a:solidFill>
               </a14:hiddenFill>
             </a:ext>
             <a:ext uri="{91240B29-F687-4F45-9708-019B960494DF}">
-              <a14:hiddenLine xmlns:a14="http://schemas.microsoft.com/office/drawing/2010/main" w="9525">
+              <a14:hiddenLine xmlns:a14="http://schemas.microsoft.com/office/drawing/2010/main" xmlns="" w="9525">
                 <a:solidFill>
                   <a:schemeClr val="tx1"/>
                 </a:solidFill>
@@ -4569,7 +4593,7 @@
               </a14:hiddenLine>
             </a:ext>
             <a:ext uri="{AF507438-7753-43E0-B8FC-AC1667EBCBE1}">
-              <a14:hiddenEffects xmlns:a14="http://schemas.microsoft.com/office/drawing/2010/main">
+              <a14:hiddenEffects xmlns:a14="http://schemas.microsoft.com/office/drawing/2010/main" xmlns="">
                 <a:effectLst>
                   <a:outerShdw dist="35921" dir="2700000" algn="ctr" rotWithShape="0">
                     <a:schemeClr val="bg2"/>
@@ -4589,10 +4613,10 @@
           <p:nvPr/>
         </p:nvPicPr>
         <p:blipFill>
-          <a:blip r:embed="rId4">
+          <a:blip r:embed="rId4" cstate="print">
             <a:extLst>
               <a:ext uri="{28A0092B-C50C-407E-A947-70E740481C1C}">
-                <a14:useLocalDpi xmlns:a14="http://schemas.microsoft.com/office/drawing/2010/main" val="0"/>
+                <a14:useLocalDpi xmlns:a14="http://schemas.microsoft.com/office/drawing/2010/main" xmlns="" val="0"/>
               </a:ext>
             </a:extLst>
           </a:blip>
@@ -4616,14 +4640,14 @@
           <a:effectLst/>
           <a:extLst>
             <a:ext uri="{909E8E84-426E-40DD-AFC4-6F175D3DCCD1}">
-              <a14:hiddenFill xmlns:a14="http://schemas.microsoft.com/office/drawing/2010/main">
+              <a14:hiddenFill xmlns:a14="http://schemas.microsoft.com/office/drawing/2010/main" xmlns="">
                 <a:solidFill>
                   <a:schemeClr val="accent1"/>
                 </a:solidFill>
               </a14:hiddenFill>
             </a:ext>
             <a:ext uri="{91240B29-F687-4F45-9708-019B960494DF}">
-              <a14:hiddenLine xmlns:a14="http://schemas.microsoft.com/office/drawing/2010/main" w="9525">
+              <a14:hiddenLine xmlns:a14="http://schemas.microsoft.com/office/drawing/2010/main" xmlns="" w="9525">
                 <a:solidFill>
                   <a:schemeClr val="tx1"/>
                 </a:solidFill>
@@ -4633,7 +4657,7 @@
               </a14:hiddenLine>
             </a:ext>
             <a:ext uri="{AF507438-7753-43E0-B8FC-AC1667EBCBE1}">
-              <a14:hiddenEffects xmlns:a14="http://schemas.microsoft.com/office/drawing/2010/main">
+              <a14:hiddenEffects xmlns:a14="http://schemas.microsoft.com/office/drawing/2010/main" xmlns="">
                 <a:effectLst>
                   <a:outerShdw dist="35921" dir="2700000" algn="ctr" rotWithShape="0">
                     <a:schemeClr val="bg2"/>
@@ -4647,7 +4671,7 @@
     </p:spTree>
     <p:extLst>
       <p:ext uri="{BB962C8B-B14F-4D97-AF65-F5344CB8AC3E}">
-        <p14:creationId xmlns:p14="http://schemas.microsoft.com/office/powerpoint/2010/main" val="424393772"/>
+        <p14:creationId xmlns:p14="http://schemas.microsoft.com/office/powerpoint/2010/main" xmlns="" val="424393772"/>
       </p:ext>
     </p:extLst>
   </p:cSld>
@@ -4753,10 +4777,10 @@
           <p:nvPr/>
         </p:nvPicPr>
         <p:blipFill>
-          <a:blip r:embed="rId2">
+          <a:blip r:embed="rId2" cstate="print">
             <a:extLst>
               <a:ext uri="{28A0092B-C50C-407E-A947-70E740481C1C}">
-                <a14:useLocalDpi xmlns:a14="http://schemas.microsoft.com/office/drawing/2010/main" val="0"/>
+                <a14:useLocalDpi xmlns:a14="http://schemas.microsoft.com/office/drawing/2010/main" xmlns="" val="0"/>
               </a:ext>
             </a:extLst>
           </a:blip>
@@ -4776,7 +4800,7 @@
           <a:noFill/>
           <a:extLst>
             <a:ext uri="{909E8E84-426E-40DD-AFC4-6F175D3DCCD1}">
-              <a14:hiddenFill xmlns:a14="http://schemas.microsoft.com/office/drawing/2010/main">
+              <a14:hiddenFill xmlns:a14="http://schemas.microsoft.com/office/drawing/2010/main" xmlns="">
                 <a:solidFill>
                   <a:srgbClr val="FFFFFF"/>
                 </a:solidFill>
@@ -4788,7 +4812,7 @@
     </p:spTree>
     <p:extLst>
       <p:ext uri="{BB962C8B-B14F-4D97-AF65-F5344CB8AC3E}">
-        <p14:creationId xmlns:p14="http://schemas.microsoft.com/office/powerpoint/2010/main" val="4123940548"/>
+        <p14:creationId xmlns:p14="http://schemas.microsoft.com/office/powerpoint/2010/main" xmlns="" val="4123940548"/>
       </p:ext>
     </p:extLst>
   </p:cSld>
@@ -4941,7 +4965,7 @@
           <p:nvPr/>
         </p:nvPicPr>
         <p:blipFill>
-          <a:blip r:embed="rId2">
+          <a:blip r:embed="rId2" cstate="print">
             <a:clrChange>
               <a:clrFrom>
                 <a:srgbClr val="FFF200"/>
@@ -4954,7 +4978,7 @@
             </a:clrChange>
             <a:extLst>
               <a:ext uri="{28A0092B-C50C-407E-A947-70E740481C1C}">
-                <a14:useLocalDpi xmlns:a14="http://schemas.microsoft.com/office/drawing/2010/main" val="0"/>
+                <a14:useLocalDpi xmlns:a14="http://schemas.microsoft.com/office/drawing/2010/main" xmlns="" val="0"/>
               </a:ext>
             </a:extLst>
           </a:blip>
@@ -4978,14 +5002,14 @@
           <a:effectLst/>
           <a:extLst>
             <a:ext uri="{909E8E84-426E-40DD-AFC4-6F175D3DCCD1}">
-              <a14:hiddenFill xmlns:a14="http://schemas.microsoft.com/office/drawing/2010/main">
+              <a14:hiddenFill xmlns:a14="http://schemas.microsoft.com/office/drawing/2010/main" xmlns="">
                 <a:solidFill>
                   <a:schemeClr val="accent1"/>
                 </a:solidFill>
               </a14:hiddenFill>
             </a:ext>
             <a:ext uri="{91240B29-F687-4F45-9708-019B960494DF}">
-              <a14:hiddenLine xmlns:a14="http://schemas.microsoft.com/office/drawing/2010/main" w="9525">
+              <a14:hiddenLine xmlns:a14="http://schemas.microsoft.com/office/drawing/2010/main" xmlns="" w="9525">
                 <a:solidFill>
                   <a:schemeClr val="tx1"/>
                 </a:solidFill>
@@ -4995,7 +5019,7 @@
               </a14:hiddenLine>
             </a:ext>
             <a:ext uri="{AF507438-7753-43E0-B8FC-AC1667EBCBE1}">
-              <a14:hiddenEffects xmlns:a14="http://schemas.microsoft.com/office/drawing/2010/main">
+              <a14:hiddenEffects xmlns:a14="http://schemas.microsoft.com/office/drawing/2010/main" xmlns="">
                 <a:effectLst>
                   <a:outerShdw dist="35921" dir="2700000" algn="ctr" rotWithShape="0">
                     <a:schemeClr val="bg2"/>
@@ -5009,7 +5033,7 @@
     </p:spTree>
     <p:extLst>
       <p:ext uri="{BB962C8B-B14F-4D97-AF65-F5344CB8AC3E}">
-        <p14:creationId xmlns:p14="http://schemas.microsoft.com/office/powerpoint/2010/main" val="2515279697"/>
+        <p14:creationId xmlns:p14="http://schemas.microsoft.com/office/powerpoint/2010/main" xmlns="" val="2515279697"/>
       </p:ext>
     </p:extLst>
   </p:cSld>
@@ -5158,7 +5182,7 @@
     </p:spTree>
     <p:extLst>
       <p:ext uri="{BB962C8B-B14F-4D97-AF65-F5344CB8AC3E}">
-        <p14:creationId xmlns:p14="http://schemas.microsoft.com/office/powerpoint/2010/main" val="816144802"/>
+        <p14:creationId xmlns:p14="http://schemas.microsoft.com/office/powerpoint/2010/main" xmlns="" val="816144802"/>
       </p:ext>
     </p:extLst>
   </p:cSld>
@@ -5271,12 +5295,12 @@
               <a:t>What other </a:t>
             </a:r>
             <a:r>
-              <a:rPr lang="en-US" dirty="0" err="1" smtClean="0"/>
-              <a:t>organisations</a:t>
-            </a:r>
-            <a:r>
-              <a:rPr lang="en-US" dirty="0" smtClean="0"/>
-              <a:t> are researching a certain subject?</a:t>
+              <a:rPr lang="en-US" dirty="0" smtClean="0"/>
+              <a:t>organizations </a:t>
+            </a:r>
+            <a:r>
+              <a:rPr lang="en-US" dirty="0" smtClean="0"/>
+              <a:t>are researching a certain subject?</a:t>
             </a:r>
           </a:p>
           <a:p>
@@ -5311,7 +5335,7 @@
           <a:blip r:embed="rId2" cstate="print">
             <a:extLst>
               <a:ext uri="{28A0092B-C50C-407E-A947-70E740481C1C}">
-                <a14:useLocalDpi xmlns:a14="http://schemas.microsoft.com/office/drawing/2010/main" val="0"/>
+                <a14:useLocalDpi xmlns:a14="http://schemas.microsoft.com/office/drawing/2010/main" xmlns="" val="0"/>
               </a:ext>
             </a:extLst>
           </a:blip>
@@ -5331,7 +5355,7 @@
           <a:noFill/>
           <a:extLst>
             <a:ext uri="{909E8E84-426E-40DD-AFC4-6F175D3DCCD1}">
-              <a14:hiddenFill xmlns:a14="http://schemas.microsoft.com/office/drawing/2010/main">
+              <a14:hiddenFill xmlns:a14="http://schemas.microsoft.com/office/drawing/2010/main" xmlns="">
                 <a:solidFill>
                   <a:srgbClr val="FFFFFF"/>
                 </a:solidFill>
@@ -5343,7 +5367,7 @@
     </p:spTree>
     <p:extLst>
       <p:ext uri="{BB962C8B-B14F-4D97-AF65-F5344CB8AC3E}">
-        <p14:creationId xmlns:p14="http://schemas.microsoft.com/office/powerpoint/2010/main" val="941338223"/>
+        <p14:creationId xmlns:p14="http://schemas.microsoft.com/office/powerpoint/2010/main" xmlns="" val="941338223"/>
       </p:ext>
     </p:extLst>
   </p:cSld>
@@ -5470,10 +5494,10 @@
           <p:nvPr/>
         </p:nvPicPr>
         <p:blipFill>
-          <a:blip r:embed="rId3">
+          <a:blip r:embed="rId3" cstate="print">
             <a:extLst>
               <a:ext uri="{28A0092B-C50C-407E-A947-70E740481C1C}">
-                <a14:useLocalDpi xmlns:a14="http://schemas.microsoft.com/office/drawing/2010/main" val="0"/>
+                <a14:useLocalDpi xmlns:a14="http://schemas.microsoft.com/office/drawing/2010/main" xmlns="" val="0"/>
               </a:ext>
             </a:extLst>
           </a:blip>
@@ -5497,14 +5521,14 @@
           <a:effectLst/>
           <a:extLst>
             <a:ext uri="{909E8E84-426E-40DD-AFC4-6F175D3DCCD1}">
-              <a14:hiddenFill xmlns:a14="http://schemas.microsoft.com/office/drawing/2010/main">
+              <a14:hiddenFill xmlns:a14="http://schemas.microsoft.com/office/drawing/2010/main" xmlns="">
                 <a:solidFill>
                   <a:schemeClr val="accent1"/>
                 </a:solidFill>
               </a14:hiddenFill>
             </a:ext>
             <a:ext uri="{91240B29-F687-4F45-9708-019B960494DF}">
-              <a14:hiddenLine xmlns:a14="http://schemas.microsoft.com/office/drawing/2010/main" w="9525">
+              <a14:hiddenLine xmlns:a14="http://schemas.microsoft.com/office/drawing/2010/main" xmlns="" w="9525">
                 <a:solidFill>
                   <a:schemeClr val="tx1"/>
                 </a:solidFill>
@@ -5514,7 +5538,7 @@
               </a14:hiddenLine>
             </a:ext>
             <a:ext uri="{AF507438-7753-43E0-B8FC-AC1667EBCBE1}">
-              <a14:hiddenEffects xmlns:a14="http://schemas.microsoft.com/office/drawing/2010/main">
+              <a14:hiddenEffects xmlns:a14="http://schemas.microsoft.com/office/drawing/2010/main" xmlns="">
                 <a:effectLst>
                   <a:outerShdw dist="35921" dir="2700000" algn="ctr" rotWithShape="0">
                     <a:schemeClr val="bg2"/>
@@ -5528,7 +5552,7 @@
     </p:spTree>
     <p:extLst>
       <p:ext uri="{BB962C8B-B14F-4D97-AF65-F5344CB8AC3E}">
-        <p14:creationId xmlns:p14="http://schemas.microsoft.com/office/powerpoint/2010/main" val="2521051551"/>
+        <p14:creationId xmlns:p14="http://schemas.microsoft.com/office/powerpoint/2010/main" xmlns="" val="2521051551"/>
       </p:ext>
     </p:extLst>
   </p:cSld>
@@ -5650,7 +5674,7 @@
           <a:blip r:embed="rId3" cstate="print">
             <a:extLst>
               <a:ext uri="{28A0092B-C50C-407E-A947-70E740481C1C}">
-                <a14:useLocalDpi xmlns:a14="http://schemas.microsoft.com/office/drawing/2010/main" val="0"/>
+                <a14:useLocalDpi xmlns:a14="http://schemas.microsoft.com/office/drawing/2010/main" xmlns="" val="0"/>
               </a:ext>
             </a:extLst>
           </a:blip>
@@ -5674,14 +5698,14 @@
           <a:effectLst/>
           <a:extLst>
             <a:ext uri="{909E8E84-426E-40DD-AFC4-6F175D3DCCD1}">
-              <a14:hiddenFill xmlns:a14="http://schemas.microsoft.com/office/drawing/2010/main">
+              <a14:hiddenFill xmlns:a14="http://schemas.microsoft.com/office/drawing/2010/main" xmlns="">
                 <a:solidFill>
                   <a:schemeClr val="accent1"/>
                 </a:solidFill>
               </a14:hiddenFill>
             </a:ext>
             <a:ext uri="{91240B29-F687-4F45-9708-019B960494DF}">
-              <a14:hiddenLine xmlns:a14="http://schemas.microsoft.com/office/drawing/2010/main" w="9525">
+              <a14:hiddenLine xmlns:a14="http://schemas.microsoft.com/office/drawing/2010/main" xmlns="" w="9525">
                 <a:solidFill>
                   <a:schemeClr val="tx1"/>
                 </a:solidFill>
@@ -5691,7 +5715,7 @@
               </a14:hiddenLine>
             </a:ext>
             <a:ext uri="{AF507438-7753-43E0-B8FC-AC1667EBCBE1}">
-              <a14:hiddenEffects xmlns:a14="http://schemas.microsoft.com/office/drawing/2010/main">
+              <a14:hiddenEffects xmlns:a14="http://schemas.microsoft.com/office/drawing/2010/main" xmlns="">
                 <a:effectLst>
                   <a:outerShdw dist="35921" dir="2700000" algn="ctr" rotWithShape="0">
                     <a:schemeClr val="bg2"/>
@@ -5705,7 +5729,7 @@
     </p:spTree>
     <p:extLst>
       <p:ext uri="{BB962C8B-B14F-4D97-AF65-F5344CB8AC3E}">
-        <p14:creationId xmlns:p14="http://schemas.microsoft.com/office/powerpoint/2010/main" val="2485197033"/>
+        <p14:creationId xmlns:p14="http://schemas.microsoft.com/office/powerpoint/2010/main" xmlns="" val="2485197033"/>
       </p:ext>
     </p:extLst>
   </p:cSld>
@@ -5811,10 +5835,10 @@
           <p:nvPr/>
         </p:nvPicPr>
         <p:blipFill>
-          <a:blip r:embed="rId2">
+          <a:blip r:embed="rId2" cstate="print">
             <a:extLst>
               <a:ext uri="{28A0092B-C50C-407E-A947-70E740481C1C}">
-                <a14:useLocalDpi xmlns:a14="http://schemas.microsoft.com/office/drawing/2010/main" val="0"/>
+                <a14:useLocalDpi xmlns:a14="http://schemas.microsoft.com/office/drawing/2010/main" xmlns="" val="0"/>
               </a:ext>
             </a:extLst>
           </a:blip>
@@ -5838,14 +5862,14 @@
           <a:effectLst/>
           <a:extLst>
             <a:ext uri="{909E8E84-426E-40DD-AFC4-6F175D3DCCD1}">
-              <a14:hiddenFill xmlns:a14="http://schemas.microsoft.com/office/drawing/2010/main">
+              <a14:hiddenFill xmlns:a14="http://schemas.microsoft.com/office/drawing/2010/main" xmlns="">
                 <a:solidFill>
                   <a:schemeClr val="accent1"/>
                 </a:solidFill>
               </a14:hiddenFill>
             </a:ext>
             <a:ext uri="{91240B29-F687-4F45-9708-019B960494DF}">
-              <a14:hiddenLine xmlns:a14="http://schemas.microsoft.com/office/drawing/2010/main" w="9525">
+              <a14:hiddenLine xmlns:a14="http://schemas.microsoft.com/office/drawing/2010/main" xmlns="" w="9525">
                 <a:solidFill>
                   <a:schemeClr val="tx1"/>
                 </a:solidFill>
@@ -5855,7 +5879,7 @@
               </a14:hiddenLine>
             </a:ext>
             <a:ext uri="{AF507438-7753-43E0-B8FC-AC1667EBCBE1}">
-              <a14:hiddenEffects xmlns:a14="http://schemas.microsoft.com/office/drawing/2010/main">
+              <a14:hiddenEffects xmlns:a14="http://schemas.microsoft.com/office/drawing/2010/main" xmlns="">
                 <a:effectLst>
                   <a:outerShdw dist="35921" dir="2700000" algn="ctr" rotWithShape="0">
                     <a:schemeClr val="bg2"/>
@@ -5869,7 +5893,7 @@
     </p:spTree>
     <p:extLst>
       <p:ext uri="{BB962C8B-B14F-4D97-AF65-F5344CB8AC3E}">
-        <p14:creationId xmlns:p14="http://schemas.microsoft.com/office/powerpoint/2010/main" val="139512369"/>
+        <p14:creationId xmlns:p14="http://schemas.microsoft.com/office/powerpoint/2010/main" xmlns="" val="139512369"/>
       </p:ext>
     </p:extLst>
   </p:cSld>
@@ -5958,10 +5982,10 @@
           <p:nvPr/>
         </p:nvPicPr>
         <p:blipFill>
-          <a:blip r:embed="rId2">
+          <a:blip r:embed="rId2" cstate="print">
             <a:extLst>
               <a:ext uri="{28A0092B-C50C-407E-A947-70E740481C1C}">
-                <a14:useLocalDpi xmlns:a14="http://schemas.microsoft.com/office/drawing/2010/main" val="0"/>
+                <a14:useLocalDpi xmlns:a14="http://schemas.microsoft.com/office/drawing/2010/main" xmlns="" val="0"/>
               </a:ext>
             </a:extLst>
           </a:blip>
@@ -5985,14 +6009,14 @@
           <a:effectLst/>
           <a:extLst>
             <a:ext uri="{909E8E84-426E-40DD-AFC4-6F175D3DCCD1}">
-              <a14:hiddenFill xmlns:a14="http://schemas.microsoft.com/office/drawing/2010/main">
+              <a14:hiddenFill xmlns:a14="http://schemas.microsoft.com/office/drawing/2010/main" xmlns="">
                 <a:solidFill>
                   <a:schemeClr val="accent1"/>
                 </a:solidFill>
               </a14:hiddenFill>
             </a:ext>
             <a:ext uri="{91240B29-F687-4F45-9708-019B960494DF}">
-              <a14:hiddenLine xmlns:a14="http://schemas.microsoft.com/office/drawing/2010/main" w="9525">
+              <a14:hiddenLine xmlns:a14="http://schemas.microsoft.com/office/drawing/2010/main" xmlns="" w="9525">
                 <a:solidFill>
                   <a:schemeClr val="tx1"/>
                 </a:solidFill>
@@ -6002,7 +6026,7 @@
               </a14:hiddenLine>
             </a:ext>
             <a:ext uri="{AF507438-7753-43E0-B8FC-AC1667EBCBE1}">
-              <a14:hiddenEffects xmlns:a14="http://schemas.microsoft.com/office/drawing/2010/main">
+              <a14:hiddenEffects xmlns:a14="http://schemas.microsoft.com/office/drawing/2010/main" xmlns="">
                 <a:effectLst>
                   <a:outerShdw dist="35921" dir="2700000" algn="ctr" rotWithShape="0">
                     <a:schemeClr val="bg2"/>
@@ -6022,10 +6046,10 @@
           <p:nvPr/>
         </p:nvPicPr>
         <p:blipFill>
-          <a:blip r:embed="rId3">
+          <a:blip r:embed="rId3" cstate="print">
             <a:extLst>
               <a:ext uri="{28A0092B-C50C-407E-A947-70E740481C1C}">
-                <a14:useLocalDpi xmlns:a14="http://schemas.microsoft.com/office/drawing/2010/main" val="0"/>
+                <a14:useLocalDpi xmlns:a14="http://schemas.microsoft.com/office/drawing/2010/main" xmlns="" val="0"/>
               </a:ext>
             </a:extLst>
           </a:blip>
@@ -6049,14 +6073,14 @@
           <a:effectLst/>
           <a:extLst>
             <a:ext uri="{909E8E84-426E-40DD-AFC4-6F175D3DCCD1}">
-              <a14:hiddenFill xmlns:a14="http://schemas.microsoft.com/office/drawing/2010/main">
+              <a14:hiddenFill xmlns:a14="http://schemas.microsoft.com/office/drawing/2010/main" xmlns="">
                 <a:solidFill>
                   <a:schemeClr val="accent1"/>
                 </a:solidFill>
               </a14:hiddenFill>
             </a:ext>
             <a:ext uri="{91240B29-F687-4F45-9708-019B960494DF}">
-              <a14:hiddenLine xmlns:a14="http://schemas.microsoft.com/office/drawing/2010/main" w="9525">
+              <a14:hiddenLine xmlns:a14="http://schemas.microsoft.com/office/drawing/2010/main" xmlns="" w="9525">
                 <a:solidFill>
                   <a:schemeClr val="tx1"/>
                 </a:solidFill>
@@ -6066,7 +6090,7 @@
               </a14:hiddenLine>
             </a:ext>
             <a:ext uri="{AF507438-7753-43E0-B8FC-AC1667EBCBE1}">
-              <a14:hiddenEffects xmlns:a14="http://schemas.microsoft.com/office/drawing/2010/main">
+              <a14:hiddenEffects xmlns:a14="http://schemas.microsoft.com/office/drawing/2010/main" xmlns="">
                 <a:effectLst>
                   <a:outerShdw dist="35921" dir="2700000" algn="ctr" rotWithShape="0">
                     <a:schemeClr val="bg2"/>
@@ -6080,7 +6104,7 @@
     </p:spTree>
     <p:extLst>
       <p:ext uri="{BB962C8B-B14F-4D97-AF65-F5344CB8AC3E}">
-        <p14:creationId xmlns:p14="http://schemas.microsoft.com/office/powerpoint/2010/main" val="2245152277"/>
+        <p14:creationId xmlns:p14="http://schemas.microsoft.com/office/powerpoint/2010/main" xmlns="" val="2245152277"/>
       </p:ext>
     </p:extLst>
   </p:cSld>
@@ -6183,7 +6207,7 @@
     </p:spTree>
     <p:extLst>
       <p:ext uri="{BB962C8B-B14F-4D97-AF65-F5344CB8AC3E}">
-        <p14:creationId xmlns:p14="http://schemas.microsoft.com/office/powerpoint/2010/main" val="3959217640"/>
+        <p14:creationId xmlns:p14="http://schemas.microsoft.com/office/powerpoint/2010/main" xmlns="" val="3959217640"/>
       </p:ext>
     </p:extLst>
   </p:cSld>
@@ -6271,7 +6295,7 @@
     </p:spTree>
     <p:extLst>
       <p:ext uri="{BB962C8B-B14F-4D97-AF65-F5344CB8AC3E}">
-        <p14:creationId xmlns:p14="http://schemas.microsoft.com/office/powerpoint/2010/main" val="98984593"/>
+        <p14:creationId xmlns:p14="http://schemas.microsoft.com/office/powerpoint/2010/main" xmlns="" val="98984593"/>
       </p:ext>
     </p:extLst>
   </p:cSld>

</xml_diff>

<commit_message>
incorporated sus score in presentation
</commit_message>
<xml_diff>
--- a/presentation/LAK Dataset Visualization - v2.pptx
+++ b/presentation/LAK Dataset Visualization - v2.pptx
@@ -5,7 +5,7 @@
     <p:sldMasterId id="2147483648" r:id="rId1"/>
   </p:sldMasterIdLst>
   <p:notesMasterIdLst>
-    <p:notesMasterId r:id="rId15"/>
+    <p:notesMasterId r:id="rId16"/>
   </p:notesMasterIdLst>
   <p:sldIdLst>
     <p:sldId id="256" r:id="rId2"/>
@@ -21,6 +21,7 @@
     <p:sldId id="264" r:id="rId12"/>
     <p:sldId id="265" r:id="rId13"/>
     <p:sldId id="266" r:id="rId14"/>
+    <p:sldId id="271" r:id="rId15"/>
   </p:sldIdLst>
   <p:sldSz cx="9144000" cy="6858000" type="screen4x3"/>
   <p:notesSz cx="6858000" cy="9144000"/>
@@ -374,7 +375,7 @@
     </p:spTree>
     <p:extLst>
       <p:ext uri="{BB962C8B-B14F-4D97-AF65-F5344CB8AC3E}">
-        <p14:creationId xmlns="" xmlns:p14="http://schemas.microsoft.com/office/powerpoint/2010/main" val="476566289"/>
+        <p14:creationId xmlns:p14="http://schemas.microsoft.com/office/powerpoint/2010/main" xmlns="" val="476566289"/>
       </p:ext>
     </p:extLst>
   </p:cSld>
@@ -600,7 +601,7 @@
     </p:spTree>
     <p:extLst>
       <p:ext uri="{BB962C8B-B14F-4D97-AF65-F5344CB8AC3E}">
-        <p14:creationId xmlns="" xmlns:p14="http://schemas.microsoft.com/office/powerpoint/2010/main" val="234455060"/>
+        <p14:creationId xmlns:p14="http://schemas.microsoft.com/office/powerpoint/2010/main" xmlns="" val="234455060"/>
       </p:ext>
     </p:extLst>
   </p:cSld>
@@ -749,7 +750,7 @@
     </p:spTree>
     <p:extLst>
       <p:ext uri="{BB962C8B-B14F-4D97-AF65-F5344CB8AC3E}">
-        <p14:creationId xmlns="" xmlns:p14="http://schemas.microsoft.com/office/powerpoint/2010/main" val="130345716"/>
+        <p14:creationId xmlns:p14="http://schemas.microsoft.com/office/powerpoint/2010/main" xmlns="" val="130345716"/>
       </p:ext>
     </p:extLst>
   </p:cSld>
@@ -993,7 +994,7 @@
     </p:spTree>
     <p:extLst>
       <p:ext uri="{BB962C8B-B14F-4D97-AF65-F5344CB8AC3E}">
-        <p14:creationId xmlns="" xmlns:p14="http://schemas.microsoft.com/office/powerpoint/2010/main" val="1991621647"/>
+        <p14:creationId xmlns:p14="http://schemas.microsoft.com/office/powerpoint/2010/main" xmlns="" val="1991621647"/>
       </p:ext>
     </p:extLst>
   </p:cSld>
@@ -1165,7 +1166,7 @@
     </p:spTree>
     <p:extLst>
       <p:ext uri="{BB962C8B-B14F-4D97-AF65-F5344CB8AC3E}">
-        <p14:creationId xmlns="" xmlns:p14="http://schemas.microsoft.com/office/powerpoint/2010/main" val="2011108903"/>
+        <p14:creationId xmlns:p14="http://schemas.microsoft.com/office/powerpoint/2010/main" xmlns="" val="2011108903"/>
       </p:ext>
     </p:extLst>
   </p:cSld>
@@ -1347,7 +1348,7 @@
     </p:spTree>
     <p:extLst>
       <p:ext uri="{BB962C8B-B14F-4D97-AF65-F5344CB8AC3E}">
-        <p14:creationId xmlns="" xmlns:p14="http://schemas.microsoft.com/office/powerpoint/2010/main" val="2728416370"/>
+        <p14:creationId xmlns:p14="http://schemas.microsoft.com/office/powerpoint/2010/main" xmlns="" val="2728416370"/>
       </p:ext>
     </p:extLst>
   </p:cSld>
@@ -1519,7 +1520,7 @@
     </p:spTree>
     <p:extLst>
       <p:ext uri="{BB962C8B-B14F-4D97-AF65-F5344CB8AC3E}">
-        <p14:creationId xmlns="" xmlns:p14="http://schemas.microsoft.com/office/powerpoint/2010/main" val="528057498"/>
+        <p14:creationId xmlns:p14="http://schemas.microsoft.com/office/powerpoint/2010/main" xmlns="" val="528057498"/>
       </p:ext>
     </p:extLst>
   </p:cSld>
@@ -1767,7 +1768,7 @@
     </p:spTree>
     <p:extLst>
       <p:ext uri="{BB962C8B-B14F-4D97-AF65-F5344CB8AC3E}">
-        <p14:creationId xmlns="" xmlns:p14="http://schemas.microsoft.com/office/powerpoint/2010/main" val="2370346862"/>
+        <p14:creationId xmlns:p14="http://schemas.microsoft.com/office/powerpoint/2010/main" xmlns="" val="2370346862"/>
       </p:ext>
     </p:extLst>
   </p:cSld>
@@ -2057,7 +2058,7 @@
     </p:spTree>
     <p:extLst>
       <p:ext uri="{BB962C8B-B14F-4D97-AF65-F5344CB8AC3E}">
-        <p14:creationId xmlns="" xmlns:p14="http://schemas.microsoft.com/office/powerpoint/2010/main" val="2795977544"/>
+        <p14:creationId xmlns:p14="http://schemas.microsoft.com/office/powerpoint/2010/main" xmlns="" val="2795977544"/>
       </p:ext>
     </p:extLst>
   </p:cSld>
@@ -2481,7 +2482,7 @@
     </p:spTree>
     <p:extLst>
       <p:ext uri="{BB962C8B-B14F-4D97-AF65-F5344CB8AC3E}">
-        <p14:creationId xmlns="" xmlns:p14="http://schemas.microsoft.com/office/powerpoint/2010/main" val="1434580930"/>
+        <p14:creationId xmlns:p14="http://schemas.microsoft.com/office/powerpoint/2010/main" xmlns="" val="1434580930"/>
       </p:ext>
     </p:extLst>
   </p:cSld>
@@ -2601,7 +2602,7 @@
     </p:spTree>
     <p:extLst>
       <p:ext uri="{BB962C8B-B14F-4D97-AF65-F5344CB8AC3E}">
-        <p14:creationId xmlns="" xmlns:p14="http://schemas.microsoft.com/office/powerpoint/2010/main" val="3970465546"/>
+        <p14:creationId xmlns:p14="http://schemas.microsoft.com/office/powerpoint/2010/main" xmlns="" val="3970465546"/>
       </p:ext>
     </p:extLst>
   </p:cSld>
@@ -2698,7 +2699,7 @@
     </p:spTree>
     <p:extLst>
       <p:ext uri="{BB962C8B-B14F-4D97-AF65-F5344CB8AC3E}">
-        <p14:creationId xmlns="" xmlns:p14="http://schemas.microsoft.com/office/powerpoint/2010/main" val="3891936300"/>
+        <p14:creationId xmlns:p14="http://schemas.microsoft.com/office/powerpoint/2010/main" xmlns="" val="3891936300"/>
       </p:ext>
     </p:extLst>
   </p:cSld>
@@ -2977,7 +2978,7 @@
     </p:spTree>
     <p:extLst>
       <p:ext uri="{BB962C8B-B14F-4D97-AF65-F5344CB8AC3E}">
-        <p14:creationId xmlns="" xmlns:p14="http://schemas.microsoft.com/office/powerpoint/2010/main" val="2949125007"/>
+        <p14:creationId xmlns:p14="http://schemas.microsoft.com/office/powerpoint/2010/main" xmlns="" val="2949125007"/>
       </p:ext>
     </p:extLst>
   </p:cSld>
@@ -3232,7 +3233,7 @@
     </p:spTree>
     <p:extLst>
       <p:ext uri="{BB962C8B-B14F-4D97-AF65-F5344CB8AC3E}">
-        <p14:creationId xmlns="" xmlns:p14="http://schemas.microsoft.com/office/powerpoint/2010/main" val="1068751909"/>
+        <p14:creationId xmlns:p14="http://schemas.microsoft.com/office/powerpoint/2010/main" xmlns="" val="1068751909"/>
       </p:ext>
     </p:extLst>
   </p:cSld>
@@ -3483,7 +3484,7 @@
     </p:spTree>
     <p:extLst>
       <p:ext uri="{BB962C8B-B14F-4D97-AF65-F5344CB8AC3E}">
-        <p14:creationId xmlns="" xmlns:p14="http://schemas.microsoft.com/office/powerpoint/2010/main" val="1722780671"/>
+        <p14:creationId xmlns:p14="http://schemas.microsoft.com/office/powerpoint/2010/main" xmlns="" val="1722780671"/>
       </p:ext>
     </p:extLst>
   </p:cSld>
@@ -3886,14 +3887,14 @@
           <a:effectLst/>
           <a:extLst>
             <a:ext uri="{909E8E84-426E-40DD-AFC4-6F175D3DCCD1}">
-              <a14:hiddenFill xmlns="" xmlns:a14="http://schemas.microsoft.com/office/drawing/2010/main">
+              <a14:hiddenFill xmlns:a14="http://schemas.microsoft.com/office/drawing/2010/main" xmlns="">
                 <a:solidFill>
                   <a:schemeClr val="accent1"/>
                 </a:solidFill>
               </a14:hiddenFill>
             </a:ext>
             <a:ext uri="{91240B29-F687-4F45-9708-019B960494DF}">
-              <a14:hiddenLine xmlns="" xmlns:a14="http://schemas.microsoft.com/office/drawing/2010/main" w="9525">
+              <a14:hiddenLine xmlns:a14="http://schemas.microsoft.com/office/drawing/2010/main" xmlns="" w="9525">
                 <a:solidFill>
                   <a:schemeClr val="tx1"/>
                 </a:solidFill>
@@ -3903,7 +3904,7 @@
               </a14:hiddenLine>
             </a:ext>
             <a:ext uri="{AF507438-7753-43E0-B8FC-AC1667EBCBE1}">
-              <a14:hiddenEffects xmlns="" xmlns:a14="http://schemas.microsoft.com/office/drawing/2010/main">
+              <a14:hiddenEffects xmlns:a14="http://schemas.microsoft.com/office/drawing/2010/main" xmlns="">
                 <a:effectLst>
                   <a:outerShdw dist="35921" dir="2700000" algn="ctr" rotWithShape="0">
                     <a:schemeClr val="bg2"/>
@@ -3926,7 +3927,7 @@
           <a:blip r:embed="rId3" cstate="print">
             <a:extLst>
               <a:ext uri="{28A0092B-C50C-407E-A947-70E740481C1C}">
-                <a14:useLocalDpi xmlns="" xmlns:a14="http://schemas.microsoft.com/office/drawing/2010/main" val="0"/>
+                <a14:useLocalDpi xmlns:a14="http://schemas.microsoft.com/office/drawing/2010/main" xmlns="" val="0"/>
               </a:ext>
             </a:extLst>
           </a:blip>
@@ -3950,14 +3951,14 @@
           <a:effectLst/>
           <a:extLst>
             <a:ext uri="{909E8E84-426E-40DD-AFC4-6F175D3DCCD1}">
-              <a14:hiddenFill xmlns="" xmlns:a14="http://schemas.microsoft.com/office/drawing/2010/main">
+              <a14:hiddenFill xmlns:a14="http://schemas.microsoft.com/office/drawing/2010/main" xmlns="">
                 <a:solidFill>
                   <a:schemeClr val="accent1"/>
                 </a:solidFill>
               </a14:hiddenFill>
             </a:ext>
             <a:ext uri="{91240B29-F687-4F45-9708-019B960494DF}">
-              <a14:hiddenLine xmlns="" xmlns:a14="http://schemas.microsoft.com/office/drawing/2010/main" w="9525">
+              <a14:hiddenLine xmlns:a14="http://schemas.microsoft.com/office/drawing/2010/main" xmlns="" w="9525">
                 <a:solidFill>
                   <a:schemeClr val="tx1"/>
                 </a:solidFill>
@@ -3967,7 +3968,7 @@
               </a14:hiddenLine>
             </a:ext>
             <a:ext uri="{AF507438-7753-43E0-B8FC-AC1667EBCBE1}">
-              <a14:hiddenEffects xmlns="" xmlns:a14="http://schemas.microsoft.com/office/drawing/2010/main">
+              <a14:hiddenEffects xmlns:a14="http://schemas.microsoft.com/office/drawing/2010/main" xmlns="">
                 <a:effectLst>
                   <a:outerShdw dist="35921" dir="2700000" algn="ctr" rotWithShape="0">
                     <a:schemeClr val="bg2"/>
@@ -3990,7 +3991,7 @@
           <a:blip r:embed="rId4" cstate="print">
             <a:extLst>
               <a:ext uri="{28A0092B-C50C-407E-A947-70E740481C1C}">
-                <a14:useLocalDpi xmlns="" xmlns:a14="http://schemas.microsoft.com/office/drawing/2010/main" val="0"/>
+                <a14:useLocalDpi xmlns:a14="http://schemas.microsoft.com/office/drawing/2010/main" xmlns="" val="0"/>
               </a:ext>
             </a:extLst>
           </a:blip>
@@ -4014,14 +4015,14 @@
           <a:effectLst/>
           <a:extLst>
             <a:ext uri="{909E8E84-426E-40DD-AFC4-6F175D3DCCD1}">
-              <a14:hiddenFill xmlns="" xmlns:a14="http://schemas.microsoft.com/office/drawing/2010/main">
+              <a14:hiddenFill xmlns:a14="http://schemas.microsoft.com/office/drawing/2010/main" xmlns="">
                 <a:solidFill>
                   <a:schemeClr val="accent1"/>
                 </a:solidFill>
               </a14:hiddenFill>
             </a:ext>
             <a:ext uri="{91240B29-F687-4F45-9708-019B960494DF}">
-              <a14:hiddenLine xmlns="" xmlns:a14="http://schemas.microsoft.com/office/drawing/2010/main" w="9525">
+              <a14:hiddenLine xmlns:a14="http://schemas.microsoft.com/office/drawing/2010/main" xmlns="" w="9525">
                 <a:solidFill>
                   <a:schemeClr val="tx1"/>
                 </a:solidFill>
@@ -4031,7 +4032,7 @@
               </a14:hiddenLine>
             </a:ext>
             <a:ext uri="{AF507438-7753-43E0-B8FC-AC1667EBCBE1}">
-              <a14:hiddenEffects xmlns="" xmlns:a14="http://schemas.microsoft.com/office/drawing/2010/main">
+              <a14:hiddenEffects xmlns:a14="http://schemas.microsoft.com/office/drawing/2010/main" xmlns="">
                 <a:effectLst>
                   <a:outerShdw dist="35921" dir="2700000" algn="ctr" rotWithShape="0">
                     <a:schemeClr val="bg2"/>
@@ -4045,7 +4046,7 @@
     </p:spTree>
     <p:extLst>
       <p:ext uri="{BB962C8B-B14F-4D97-AF65-F5344CB8AC3E}">
-        <p14:creationId xmlns="" xmlns:p14="http://schemas.microsoft.com/office/powerpoint/2010/main" val="2600589044"/>
+        <p14:creationId xmlns:p14="http://schemas.microsoft.com/office/powerpoint/2010/main" xmlns="" val="2600589044"/>
       </p:ext>
     </p:extLst>
   </p:cSld>
@@ -4175,7 +4176,7 @@
           <a:blip r:embed="rId2" cstate="print">
             <a:extLst>
               <a:ext uri="{28A0092B-C50C-407E-A947-70E740481C1C}">
-                <a14:useLocalDpi xmlns="" xmlns:a14="http://schemas.microsoft.com/office/drawing/2010/main" val="0"/>
+                <a14:useLocalDpi xmlns:a14="http://schemas.microsoft.com/office/drawing/2010/main" xmlns="" val="0"/>
               </a:ext>
             </a:extLst>
           </a:blip>
@@ -4199,14 +4200,14 @@
           <a:effectLst/>
           <a:extLst>
             <a:ext uri="{909E8E84-426E-40DD-AFC4-6F175D3DCCD1}">
-              <a14:hiddenFill xmlns="" xmlns:a14="http://schemas.microsoft.com/office/drawing/2010/main">
+              <a14:hiddenFill xmlns:a14="http://schemas.microsoft.com/office/drawing/2010/main" xmlns="">
                 <a:solidFill>
                   <a:schemeClr val="accent1"/>
                 </a:solidFill>
               </a14:hiddenFill>
             </a:ext>
             <a:ext uri="{91240B29-F687-4F45-9708-019B960494DF}">
-              <a14:hiddenLine xmlns="" xmlns:a14="http://schemas.microsoft.com/office/drawing/2010/main" w="9525">
+              <a14:hiddenLine xmlns:a14="http://schemas.microsoft.com/office/drawing/2010/main" xmlns="" w="9525">
                 <a:solidFill>
                   <a:schemeClr val="tx1"/>
                 </a:solidFill>
@@ -4216,7 +4217,7 @@
               </a14:hiddenLine>
             </a:ext>
             <a:ext uri="{AF507438-7753-43E0-B8FC-AC1667EBCBE1}">
-              <a14:hiddenEffects xmlns="" xmlns:a14="http://schemas.microsoft.com/office/drawing/2010/main">
+              <a14:hiddenEffects xmlns:a14="http://schemas.microsoft.com/office/drawing/2010/main" xmlns="">
                 <a:effectLst>
                   <a:outerShdw dist="35921" dir="2700000" algn="ctr" rotWithShape="0">
                     <a:schemeClr val="bg2"/>
@@ -4239,7 +4240,7 @@
           <a:blip r:embed="rId3" cstate="print">
             <a:extLst>
               <a:ext uri="{28A0092B-C50C-407E-A947-70E740481C1C}">
-                <a14:useLocalDpi xmlns="" xmlns:a14="http://schemas.microsoft.com/office/drawing/2010/main" val="0"/>
+                <a14:useLocalDpi xmlns:a14="http://schemas.microsoft.com/office/drawing/2010/main" xmlns="" val="0"/>
               </a:ext>
             </a:extLst>
           </a:blip>
@@ -4261,14 +4262,14 @@
           <a:effectLst/>
           <a:extLst>
             <a:ext uri="{909E8E84-426E-40DD-AFC4-6F175D3DCCD1}">
-              <a14:hiddenFill xmlns="" xmlns:a14="http://schemas.microsoft.com/office/drawing/2010/main">
+              <a14:hiddenFill xmlns:a14="http://schemas.microsoft.com/office/drawing/2010/main" xmlns="">
                 <a:solidFill>
                   <a:schemeClr val="accent1"/>
                 </a:solidFill>
               </a14:hiddenFill>
             </a:ext>
             <a:ext uri="{91240B29-F687-4F45-9708-019B960494DF}">
-              <a14:hiddenLine xmlns="" xmlns:a14="http://schemas.microsoft.com/office/drawing/2010/main" w="9525">
+              <a14:hiddenLine xmlns:a14="http://schemas.microsoft.com/office/drawing/2010/main" xmlns="" w="9525">
                 <a:solidFill>
                   <a:schemeClr val="tx1"/>
                 </a:solidFill>
@@ -4278,7 +4279,7 @@
               </a14:hiddenLine>
             </a:ext>
             <a:ext uri="{AF507438-7753-43E0-B8FC-AC1667EBCBE1}">
-              <a14:hiddenEffects xmlns="" xmlns:a14="http://schemas.microsoft.com/office/drawing/2010/main">
+              <a14:hiddenEffects xmlns:a14="http://schemas.microsoft.com/office/drawing/2010/main" xmlns="">
                 <a:effectLst>
                   <a:outerShdw dist="35921" dir="2700000" algn="ctr" rotWithShape="0">
                     <a:schemeClr val="bg2"/>
@@ -4364,7 +4365,7 @@
           <a:blip r:embed="rId4" cstate="print">
             <a:extLst>
               <a:ext uri="{28A0092B-C50C-407E-A947-70E740481C1C}">
-                <a14:useLocalDpi xmlns="" xmlns:a14="http://schemas.microsoft.com/office/drawing/2010/main" val="0"/>
+                <a14:useLocalDpi xmlns:a14="http://schemas.microsoft.com/office/drawing/2010/main" xmlns="" val="0"/>
               </a:ext>
             </a:extLst>
           </a:blip>
@@ -4388,14 +4389,14 @@
           <a:effectLst/>
           <a:extLst>
             <a:ext uri="{909E8E84-426E-40DD-AFC4-6F175D3DCCD1}">
-              <a14:hiddenFill xmlns="" xmlns:a14="http://schemas.microsoft.com/office/drawing/2010/main">
+              <a14:hiddenFill xmlns:a14="http://schemas.microsoft.com/office/drawing/2010/main" xmlns="">
                 <a:solidFill>
                   <a:schemeClr val="accent1"/>
                 </a:solidFill>
               </a14:hiddenFill>
             </a:ext>
             <a:ext uri="{91240B29-F687-4F45-9708-019B960494DF}">
-              <a14:hiddenLine xmlns="" xmlns:a14="http://schemas.microsoft.com/office/drawing/2010/main" w="9525">
+              <a14:hiddenLine xmlns:a14="http://schemas.microsoft.com/office/drawing/2010/main" xmlns="" w="9525">
                 <a:solidFill>
                   <a:schemeClr val="tx1"/>
                 </a:solidFill>
@@ -4405,7 +4406,7 @@
               </a14:hiddenLine>
             </a:ext>
             <a:ext uri="{AF507438-7753-43E0-B8FC-AC1667EBCBE1}">
-              <a14:hiddenEffects xmlns="" xmlns:a14="http://schemas.microsoft.com/office/drawing/2010/main">
+              <a14:hiddenEffects xmlns:a14="http://schemas.microsoft.com/office/drawing/2010/main" xmlns="">
                 <a:effectLst>
                   <a:outerShdw dist="35921" dir="2700000" algn="ctr" rotWithShape="0">
                     <a:schemeClr val="bg2"/>
@@ -4419,7 +4420,7 @@
     </p:spTree>
     <p:extLst>
       <p:ext uri="{BB962C8B-B14F-4D97-AF65-F5344CB8AC3E}">
-        <p14:creationId xmlns="" xmlns:p14="http://schemas.microsoft.com/office/powerpoint/2010/main" val="3235389205"/>
+        <p14:creationId xmlns:p14="http://schemas.microsoft.com/office/powerpoint/2010/main" xmlns="" val="3235389205"/>
       </p:ext>
     </p:extLst>
   </p:cSld>
@@ -4505,14 +4506,14 @@
           <a:effectLst/>
           <a:extLst>
             <a:ext uri="{909E8E84-426E-40DD-AFC4-6F175D3DCCD1}">
-              <a14:hiddenFill xmlns="" xmlns:a14="http://schemas.microsoft.com/office/drawing/2010/main">
+              <a14:hiddenFill xmlns:a14="http://schemas.microsoft.com/office/drawing/2010/main" xmlns="">
                 <a:solidFill>
                   <a:schemeClr val="accent1"/>
                 </a:solidFill>
               </a14:hiddenFill>
             </a:ext>
             <a:ext uri="{91240B29-F687-4F45-9708-019B960494DF}">
-              <a14:hiddenLine xmlns="" xmlns:a14="http://schemas.microsoft.com/office/drawing/2010/main" w="9525">
+              <a14:hiddenLine xmlns:a14="http://schemas.microsoft.com/office/drawing/2010/main" xmlns="" w="9525">
                 <a:solidFill>
                   <a:schemeClr val="tx1"/>
                 </a:solidFill>
@@ -4522,7 +4523,7 @@
               </a14:hiddenLine>
             </a:ext>
             <a:ext uri="{AF507438-7753-43E0-B8FC-AC1667EBCBE1}">
-              <a14:hiddenEffects xmlns="" xmlns:a14="http://schemas.microsoft.com/office/drawing/2010/main">
+              <a14:hiddenEffects xmlns:a14="http://schemas.microsoft.com/office/drawing/2010/main" xmlns="">
                 <a:effectLst>
                   <a:outerShdw dist="35921" dir="2700000" algn="ctr" rotWithShape="0">
                     <a:schemeClr val="bg2"/>
@@ -4545,7 +4546,7 @@
           <a:blip r:embed="rId3" cstate="print">
             <a:extLst>
               <a:ext uri="{28A0092B-C50C-407E-A947-70E740481C1C}">
-                <a14:useLocalDpi xmlns="" xmlns:a14="http://schemas.microsoft.com/office/drawing/2010/main" val="0"/>
+                <a14:useLocalDpi xmlns:a14="http://schemas.microsoft.com/office/drawing/2010/main" xmlns="" val="0"/>
               </a:ext>
             </a:extLst>
           </a:blip>
@@ -4569,14 +4570,14 @@
           <a:effectLst/>
           <a:extLst>
             <a:ext uri="{909E8E84-426E-40DD-AFC4-6F175D3DCCD1}">
-              <a14:hiddenFill xmlns="" xmlns:a14="http://schemas.microsoft.com/office/drawing/2010/main">
+              <a14:hiddenFill xmlns:a14="http://schemas.microsoft.com/office/drawing/2010/main" xmlns="">
                 <a:solidFill>
                   <a:schemeClr val="accent1"/>
                 </a:solidFill>
               </a14:hiddenFill>
             </a:ext>
             <a:ext uri="{91240B29-F687-4F45-9708-019B960494DF}">
-              <a14:hiddenLine xmlns="" xmlns:a14="http://schemas.microsoft.com/office/drawing/2010/main" w="9525">
+              <a14:hiddenLine xmlns:a14="http://schemas.microsoft.com/office/drawing/2010/main" xmlns="" w="9525">
                 <a:solidFill>
                   <a:schemeClr val="tx1"/>
                 </a:solidFill>
@@ -4586,7 +4587,7 @@
               </a14:hiddenLine>
             </a:ext>
             <a:ext uri="{AF507438-7753-43E0-B8FC-AC1667EBCBE1}">
-              <a14:hiddenEffects xmlns="" xmlns:a14="http://schemas.microsoft.com/office/drawing/2010/main">
+              <a14:hiddenEffects xmlns:a14="http://schemas.microsoft.com/office/drawing/2010/main" xmlns="">
                 <a:effectLst>
                   <a:outerShdw dist="35921" dir="2700000" algn="ctr" rotWithShape="0">
                     <a:schemeClr val="bg2"/>
@@ -4609,7 +4610,7 @@
           <a:blip r:embed="rId4" cstate="print">
             <a:extLst>
               <a:ext uri="{28A0092B-C50C-407E-A947-70E740481C1C}">
-                <a14:useLocalDpi xmlns="" xmlns:a14="http://schemas.microsoft.com/office/drawing/2010/main" val="0"/>
+                <a14:useLocalDpi xmlns:a14="http://schemas.microsoft.com/office/drawing/2010/main" xmlns="" val="0"/>
               </a:ext>
             </a:extLst>
           </a:blip>
@@ -4633,14 +4634,14 @@
           <a:effectLst/>
           <a:extLst>
             <a:ext uri="{909E8E84-426E-40DD-AFC4-6F175D3DCCD1}">
-              <a14:hiddenFill xmlns="" xmlns:a14="http://schemas.microsoft.com/office/drawing/2010/main">
+              <a14:hiddenFill xmlns:a14="http://schemas.microsoft.com/office/drawing/2010/main" xmlns="">
                 <a:solidFill>
                   <a:schemeClr val="accent1"/>
                 </a:solidFill>
               </a14:hiddenFill>
             </a:ext>
             <a:ext uri="{91240B29-F687-4F45-9708-019B960494DF}">
-              <a14:hiddenLine xmlns="" xmlns:a14="http://schemas.microsoft.com/office/drawing/2010/main" w="9525">
+              <a14:hiddenLine xmlns:a14="http://schemas.microsoft.com/office/drawing/2010/main" xmlns="" w="9525">
                 <a:solidFill>
                   <a:schemeClr val="tx1"/>
                 </a:solidFill>
@@ -4650,7 +4651,7 @@
               </a14:hiddenLine>
             </a:ext>
             <a:ext uri="{AF507438-7753-43E0-B8FC-AC1667EBCBE1}">
-              <a14:hiddenEffects xmlns="" xmlns:a14="http://schemas.microsoft.com/office/drawing/2010/main">
+              <a14:hiddenEffects xmlns:a14="http://schemas.microsoft.com/office/drawing/2010/main" xmlns="">
                 <a:effectLst>
                   <a:outerShdw dist="35921" dir="2700000" algn="ctr" rotWithShape="0">
                     <a:schemeClr val="bg2"/>
@@ -4664,7 +4665,7 @@
     </p:spTree>
     <p:extLst>
       <p:ext uri="{BB962C8B-B14F-4D97-AF65-F5344CB8AC3E}">
-        <p14:creationId xmlns="" xmlns:p14="http://schemas.microsoft.com/office/powerpoint/2010/main" val="424393772"/>
+        <p14:creationId xmlns:p14="http://schemas.microsoft.com/office/powerpoint/2010/main" xmlns="" val="424393772"/>
       </p:ext>
     </p:extLst>
   </p:cSld>
@@ -4773,7 +4774,7 @@
           <a:blip r:embed="rId2" cstate="print">
             <a:extLst>
               <a:ext uri="{28A0092B-C50C-407E-A947-70E740481C1C}">
-                <a14:useLocalDpi xmlns="" xmlns:a14="http://schemas.microsoft.com/office/drawing/2010/main" val="0"/>
+                <a14:useLocalDpi xmlns:a14="http://schemas.microsoft.com/office/drawing/2010/main" xmlns="" val="0"/>
               </a:ext>
             </a:extLst>
           </a:blip>
@@ -4793,7 +4794,7 @@
           <a:noFill/>
           <a:extLst>
             <a:ext uri="{909E8E84-426E-40DD-AFC4-6F175D3DCCD1}">
-              <a14:hiddenFill xmlns="" xmlns:a14="http://schemas.microsoft.com/office/drawing/2010/main">
+              <a14:hiddenFill xmlns:a14="http://schemas.microsoft.com/office/drawing/2010/main" xmlns="">
                 <a:solidFill>
                   <a:srgbClr val="FFFFFF"/>
                 </a:solidFill>
@@ -4805,7 +4806,7 @@
     </p:spTree>
     <p:extLst>
       <p:ext uri="{BB962C8B-B14F-4D97-AF65-F5344CB8AC3E}">
-        <p14:creationId xmlns="" xmlns:p14="http://schemas.microsoft.com/office/powerpoint/2010/main" val="4123940548"/>
+        <p14:creationId xmlns:p14="http://schemas.microsoft.com/office/powerpoint/2010/main" xmlns="" val="4123940548"/>
       </p:ext>
     </p:extLst>
   </p:cSld>
@@ -4915,37 +4916,10 @@
             </a:r>
           </a:p>
           <a:p>
-            <a:r>
-              <a:rPr lang="en-US" dirty="0" smtClean="0"/>
-              <a:t>TODO</a:t>
-            </a:r>
-          </a:p>
-          <a:p>
-            <a:pPr lvl="1"/>
-            <a:r>
-              <a:rPr lang="en-US" dirty="0" err="1" smtClean="0"/>
-              <a:t>Afhankelijk</a:t>
-            </a:r>
-            <a:r>
-              <a:rPr lang="en-US" dirty="0" smtClean="0"/>
-              <a:t> van </a:t>
-            </a:r>
-            <a:r>
-              <a:rPr lang="en-US" dirty="0" err="1" smtClean="0"/>
-              <a:t>wie</a:t>
-            </a:r>
-            <a:r>
-              <a:rPr lang="en-US" dirty="0" smtClean="0"/>
-              <a:t> we</a:t>
-            </a:r>
-            <a:br>
-              <a:rPr lang="en-US" dirty="0" smtClean="0"/>
-            </a:br>
-            <a:r>
-              <a:rPr lang="en-US" dirty="0" err="1" smtClean="0"/>
-              <a:t>vastkrijgen</a:t>
-            </a:r>
-            <a:endParaRPr lang="en-US" dirty="0"/>
+            <a:pPr>
+              <a:buNone/>
+            </a:pPr>
+            <a:endParaRPr lang="en-US" dirty="0" smtClean="0"/>
           </a:p>
         </p:txBody>
       </p:sp>
@@ -4971,7 +4945,7 @@
             </a:clrChange>
             <a:extLst>
               <a:ext uri="{28A0092B-C50C-407E-A947-70E740481C1C}">
-                <a14:useLocalDpi xmlns="" xmlns:a14="http://schemas.microsoft.com/office/drawing/2010/main" val="0"/>
+                <a14:useLocalDpi xmlns:a14="http://schemas.microsoft.com/office/drawing/2010/main" xmlns="" val="0"/>
               </a:ext>
             </a:extLst>
           </a:blip>
@@ -4995,14 +4969,14 @@
           <a:effectLst/>
           <a:extLst>
             <a:ext uri="{909E8E84-426E-40DD-AFC4-6F175D3DCCD1}">
-              <a14:hiddenFill xmlns="" xmlns:a14="http://schemas.microsoft.com/office/drawing/2010/main">
+              <a14:hiddenFill xmlns:a14="http://schemas.microsoft.com/office/drawing/2010/main" xmlns="">
                 <a:solidFill>
                   <a:schemeClr val="accent1"/>
                 </a:solidFill>
               </a14:hiddenFill>
             </a:ext>
             <a:ext uri="{91240B29-F687-4F45-9708-019B960494DF}">
-              <a14:hiddenLine xmlns="" xmlns:a14="http://schemas.microsoft.com/office/drawing/2010/main" w="9525">
+              <a14:hiddenLine xmlns:a14="http://schemas.microsoft.com/office/drawing/2010/main" xmlns="" w="9525">
                 <a:solidFill>
                   <a:schemeClr val="tx1"/>
                 </a:solidFill>
@@ -5012,7 +4986,7 @@
               </a14:hiddenLine>
             </a:ext>
             <a:ext uri="{AF507438-7753-43E0-B8FC-AC1667EBCBE1}">
-              <a14:hiddenEffects xmlns="" xmlns:a14="http://schemas.microsoft.com/office/drawing/2010/main">
+              <a14:hiddenEffects xmlns:a14="http://schemas.microsoft.com/office/drawing/2010/main" xmlns="">
                 <a:effectLst>
                   <a:outerShdw dist="35921" dir="2700000" algn="ctr" rotWithShape="0">
                     <a:schemeClr val="bg2"/>
@@ -5026,7 +5000,7 @@
     </p:spTree>
     <p:extLst>
       <p:ext uri="{BB962C8B-B14F-4D97-AF65-F5344CB8AC3E}">
-        <p14:creationId xmlns="" xmlns:p14="http://schemas.microsoft.com/office/powerpoint/2010/main" val="2515279697"/>
+        <p14:creationId xmlns:p14="http://schemas.microsoft.com/office/powerpoint/2010/main" xmlns="" val="2515279697"/>
       </p:ext>
     </p:extLst>
   </p:cSld>
@@ -5040,6 +5014,160 @@
       </p:par>
     </p:tnLst>
   </p:timing>
+</p:sld>
+</file>
+
+<file path=ppt/slides/slide14.xml><?xml version="1.0" encoding="utf-8"?>
+<p:sld xmlns:a="http://schemas.openxmlformats.org/drawingml/2006/main" xmlns:r="http://schemas.openxmlformats.org/officeDocument/2006/relationships" xmlns:p="http://schemas.openxmlformats.org/presentationml/2006/main">
+  <p:cSld>
+    <p:spTree>
+      <p:nvGrpSpPr>
+        <p:cNvPr id="1" name=""/>
+        <p:cNvGrpSpPr/>
+        <p:nvPr/>
+      </p:nvGrpSpPr>
+      <p:grpSpPr>
+        <a:xfrm>
+          <a:off x="0" y="0"/>
+          <a:ext cx="0" cy="0"/>
+          <a:chOff x="0" y="0"/>
+          <a:chExt cx="0" cy="0"/>
+        </a:xfrm>
+      </p:grpSpPr>
+      <p:sp>
+        <p:nvSpPr>
+          <p:cNvPr id="2" name="Titel 1"/>
+          <p:cNvSpPr>
+            <a:spLocks noGrp="1"/>
+          </p:cNvSpPr>
+          <p:nvPr>
+            <p:ph type="title"/>
+          </p:nvPr>
+        </p:nvSpPr>
+        <p:spPr/>
+        <p:txBody>
+          <a:bodyPr>
+            <a:normAutofit/>
+          </a:bodyPr>
+          <a:lstStyle/>
+          <a:p>
+            <a:r>
+              <a:rPr lang="nl-BE" dirty="0" err="1" smtClean="0"/>
+              <a:t>Evaluatio</a:t>
+            </a:r>
+            <a:r>
+              <a:rPr lang="nl-BE" dirty="0" err="1" smtClean="0"/>
+              <a:t>n</a:t>
+            </a:r>
+            <a:endParaRPr lang="nl-BE" dirty="0"/>
+          </a:p>
+        </p:txBody>
+      </p:sp>
+      <p:sp>
+        <p:nvSpPr>
+          <p:cNvPr id="3" name="Tijdelijke aanduiding voor inhoud 2"/>
+          <p:cNvSpPr>
+            <a:spLocks noGrp="1"/>
+          </p:cNvSpPr>
+          <p:nvPr>
+            <p:ph idx="1"/>
+          </p:nvPr>
+        </p:nvSpPr>
+        <p:spPr/>
+        <p:txBody>
+          <a:bodyPr/>
+          <a:lstStyle/>
+          <a:p>
+            <a:r>
+              <a:rPr lang="nl-BE" dirty="0" err="1" smtClean="0"/>
+              <a:t>Keywordmap</a:t>
+            </a:r>
+            <a:endParaRPr lang="nl-BE" dirty="0" smtClean="0"/>
+          </a:p>
+          <a:p>
+            <a:pPr lvl="1"/>
+            <a:r>
+              <a:rPr lang="nl-BE" dirty="0" smtClean="0"/>
+              <a:t>84.17</a:t>
+            </a:r>
+            <a:endParaRPr lang="nl-BE" dirty="0" smtClean="0"/>
+          </a:p>
+          <a:p>
+            <a:endParaRPr lang="nl-BE" dirty="0" smtClean="0"/>
+          </a:p>
+          <a:p>
+            <a:endParaRPr lang="nl-BE" dirty="0" smtClean="0"/>
+          </a:p>
+          <a:p>
+            <a:r>
+              <a:rPr lang="nl-BE" dirty="0" err="1" smtClean="0"/>
+              <a:t>Barchartmap</a:t>
+            </a:r>
+            <a:endParaRPr lang="nl-BE" dirty="0" smtClean="0"/>
+          </a:p>
+          <a:p>
+            <a:pPr lvl="1"/>
+            <a:r>
+              <a:rPr lang="nl-BE" dirty="0" smtClean="0"/>
+              <a:t>80.83</a:t>
+            </a:r>
+            <a:endParaRPr lang="nl-BE" dirty="0"/>
+          </a:p>
+        </p:txBody>
+      </p:sp>
+      <p:pic>
+        <p:nvPicPr>
+          <p:cNvPr id="4" name="Afbeelding 3" descr="susscoreKeywordmap.png"/>
+          <p:cNvPicPr>
+            <a:picLocks noChangeAspect="1"/>
+          </p:cNvPicPr>
+          <p:nvPr/>
+        </p:nvPicPr>
+        <p:blipFill>
+          <a:blip r:embed="rId2" cstate="print"/>
+          <a:stretch>
+            <a:fillRect/>
+          </a:stretch>
+        </p:blipFill>
+        <p:spPr>
+          <a:xfrm>
+            <a:off x="3419872" y="1700808"/>
+            <a:ext cx="4667902" cy="1467055"/>
+          </a:xfrm>
+          <a:prstGeom prst="rect">
+            <a:avLst/>
+          </a:prstGeom>
+        </p:spPr>
+      </p:pic>
+      <p:pic>
+        <p:nvPicPr>
+          <p:cNvPr id="5" name="Tijdelijke aanduiding voor inhoud 3" descr="susscoreBarchartmap.jpg"/>
+          <p:cNvPicPr>
+            <a:picLocks noChangeAspect="1"/>
+          </p:cNvPicPr>
+          <p:nvPr/>
+        </p:nvPicPr>
+        <p:blipFill>
+          <a:blip r:embed="rId3" cstate="print"/>
+          <a:stretch>
+            <a:fillRect/>
+          </a:stretch>
+        </p:blipFill>
+        <p:spPr>
+          <a:xfrm>
+            <a:off x="3491880" y="4077072"/>
+            <a:ext cx="5128846" cy="1611923"/>
+          </a:xfrm>
+          <a:prstGeom prst="rect">
+            <a:avLst/>
+          </a:prstGeom>
+        </p:spPr>
+      </p:pic>
+    </p:spTree>
+  </p:cSld>
+  <p:clrMapOvr>
+    <a:masterClrMapping/>
+  </p:clrMapOvr>
 </p:sld>
 </file>
 
@@ -5175,7 +5303,7 @@
     </p:spTree>
     <p:extLst>
       <p:ext uri="{BB962C8B-B14F-4D97-AF65-F5344CB8AC3E}">
-        <p14:creationId xmlns="" xmlns:p14="http://schemas.microsoft.com/office/powerpoint/2010/main" val="816144802"/>
+        <p14:creationId xmlns:p14="http://schemas.microsoft.com/office/powerpoint/2010/main" xmlns="" val="816144802"/>
       </p:ext>
     </p:extLst>
   </p:cSld>
@@ -5320,7 +5448,7 @@
           <a:blip r:embed="rId2" cstate="print">
             <a:extLst>
               <a:ext uri="{28A0092B-C50C-407E-A947-70E740481C1C}">
-                <a14:useLocalDpi xmlns="" xmlns:a14="http://schemas.microsoft.com/office/drawing/2010/main" val="0"/>
+                <a14:useLocalDpi xmlns:a14="http://schemas.microsoft.com/office/drawing/2010/main" xmlns="" val="0"/>
               </a:ext>
             </a:extLst>
           </a:blip>
@@ -5340,7 +5468,7 @@
           <a:noFill/>
           <a:extLst>
             <a:ext uri="{909E8E84-426E-40DD-AFC4-6F175D3DCCD1}">
-              <a14:hiddenFill xmlns="" xmlns:a14="http://schemas.microsoft.com/office/drawing/2010/main">
+              <a14:hiddenFill xmlns:a14="http://schemas.microsoft.com/office/drawing/2010/main" xmlns="">
                 <a:solidFill>
                   <a:srgbClr val="FFFFFF"/>
                 </a:solidFill>
@@ -5352,7 +5480,7 @@
     </p:spTree>
     <p:extLst>
       <p:ext uri="{BB962C8B-B14F-4D97-AF65-F5344CB8AC3E}">
-        <p14:creationId xmlns="" xmlns:p14="http://schemas.microsoft.com/office/powerpoint/2010/main" val="941338223"/>
+        <p14:creationId xmlns:p14="http://schemas.microsoft.com/office/powerpoint/2010/main" xmlns="" val="941338223"/>
       </p:ext>
     </p:extLst>
   </p:cSld>
@@ -5499,14 +5627,14 @@
           <a:effectLst/>
           <a:extLst>
             <a:ext uri="{909E8E84-426E-40DD-AFC4-6F175D3DCCD1}">
-              <a14:hiddenFill xmlns="" xmlns:a14="http://schemas.microsoft.com/office/drawing/2010/main">
+              <a14:hiddenFill xmlns:a14="http://schemas.microsoft.com/office/drawing/2010/main" xmlns="">
                 <a:solidFill>
                   <a:schemeClr val="accent1"/>
                 </a:solidFill>
               </a14:hiddenFill>
             </a:ext>
             <a:ext uri="{91240B29-F687-4F45-9708-019B960494DF}">
-              <a14:hiddenLine xmlns="" xmlns:a14="http://schemas.microsoft.com/office/drawing/2010/main" w="9525">
+              <a14:hiddenLine xmlns:a14="http://schemas.microsoft.com/office/drawing/2010/main" xmlns="" w="9525">
                 <a:solidFill>
                   <a:schemeClr val="tx1"/>
                 </a:solidFill>
@@ -5516,7 +5644,7 @@
               </a14:hiddenLine>
             </a:ext>
             <a:ext uri="{AF507438-7753-43E0-B8FC-AC1667EBCBE1}">
-              <a14:hiddenEffects xmlns="" xmlns:a14="http://schemas.microsoft.com/office/drawing/2010/main">
+              <a14:hiddenEffects xmlns:a14="http://schemas.microsoft.com/office/drawing/2010/main" xmlns="">
                 <a:effectLst>
                   <a:outerShdw dist="35921" dir="2700000" algn="ctr" rotWithShape="0">
                     <a:schemeClr val="bg2"/>
@@ -5530,7 +5658,7 @@
     </p:spTree>
     <p:extLst>
       <p:ext uri="{BB962C8B-B14F-4D97-AF65-F5344CB8AC3E}">
-        <p14:creationId xmlns="" xmlns:p14="http://schemas.microsoft.com/office/powerpoint/2010/main" val="2521051551"/>
+        <p14:creationId xmlns:p14="http://schemas.microsoft.com/office/powerpoint/2010/main" xmlns="" val="2521051551"/>
       </p:ext>
     </p:extLst>
   </p:cSld>
@@ -5652,7 +5780,7 @@
           <a:blip r:embed="rId3" cstate="print">
             <a:extLst>
               <a:ext uri="{28A0092B-C50C-407E-A947-70E740481C1C}">
-                <a14:useLocalDpi xmlns="" xmlns:a14="http://schemas.microsoft.com/office/drawing/2010/main" val="0"/>
+                <a14:useLocalDpi xmlns:a14="http://schemas.microsoft.com/office/drawing/2010/main" xmlns="" val="0"/>
               </a:ext>
             </a:extLst>
           </a:blip>
@@ -5676,14 +5804,14 @@
           <a:effectLst/>
           <a:extLst>
             <a:ext uri="{909E8E84-426E-40DD-AFC4-6F175D3DCCD1}">
-              <a14:hiddenFill xmlns="" xmlns:a14="http://schemas.microsoft.com/office/drawing/2010/main">
+              <a14:hiddenFill xmlns:a14="http://schemas.microsoft.com/office/drawing/2010/main" xmlns="">
                 <a:solidFill>
                   <a:schemeClr val="accent1"/>
                 </a:solidFill>
               </a14:hiddenFill>
             </a:ext>
             <a:ext uri="{91240B29-F687-4F45-9708-019B960494DF}">
-              <a14:hiddenLine xmlns="" xmlns:a14="http://schemas.microsoft.com/office/drawing/2010/main" w="9525">
+              <a14:hiddenLine xmlns:a14="http://schemas.microsoft.com/office/drawing/2010/main" xmlns="" w="9525">
                 <a:solidFill>
                   <a:schemeClr val="tx1"/>
                 </a:solidFill>
@@ -5693,7 +5821,7 @@
               </a14:hiddenLine>
             </a:ext>
             <a:ext uri="{AF507438-7753-43E0-B8FC-AC1667EBCBE1}">
-              <a14:hiddenEffects xmlns="" xmlns:a14="http://schemas.microsoft.com/office/drawing/2010/main">
+              <a14:hiddenEffects xmlns:a14="http://schemas.microsoft.com/office/drawing/2010/main" xmlns="">
                 <a:effectLst>
                   <a:outerShdw dist="35921" dir="2700000" algn="ctr" rotWithShape="0">
                     <a:schemeClr val="bg2"/>
@@ -5707,7 +5835,7 @@
     </p:spTree>
     <p:extLst>
       <p:ext uri="{BB962C8B-B14F-4D97-AF65-F5344CB8AC3E}">
-        <p14:creationId xmlns="" xmlns:p14="http://schemas.microsoft.com/office/powerpoint/2010/main" val="2485197033"/>
+        <p14:creationId xmlns:p14="http://schemas.microsoft.com/office/powerpoint/2010/main" xmlns="" val="2485197033"/>
       </p:ext>
     </p:extLst>
   </p:cSld>
@@ -5816,7 +5944,7 @@
           <a:blip r:embed="rId2" cstate="print">
             <a:extLst>
               <a:ext uri="{28A0092B-C50C-407E-A947-70E740481C1C}">
-                <a14:useLocalDpi xmlns="" xmlns:a14="http://schemas.microsoft.com/office/drawing/2010/main" val="0"/>
+                <a14:useLocalDpi xmlns:a14="http://schemas.microsoft.com/office/drawing/2010/main" xmlns="" val="0"/>
               </a:ext>
             </a:extLst>
           </a:blip>
@@ -5840,14 +5968,14 @@
           <a:effectLst/>
           <a:extLst>
             <a:ext uri="{909E8E84-426E-40DD-AFC4-6F175D3DCCD1}">
-              <a14:hiddenFill xmlns="" xmlns:a14="http://schemas.microsoft.com/office/drawing/2010/main">
+              <a14:hiddenFill xmlns:a14="http://schemas.microsoft.com/office/drawing/2010/main" xmlns="">
                 <a:solidFill>
                   <a:schemeClr val="accent1"/>
                 </a:solidFill>
               </a14:hiddenFill>
             </a:ext>
             <a:ext uri="{91240B29-F687-4F45-9708-019B960494DF}">
-              <a14:hiddenLine xmlns="" xmlns:a14="http://schemas.microsoft.com/office/drawing/2010/main" w="9525">
+              <a14:hiddenLine xmlns:a14="http://schemas.microsoft.com/office/drawing/2010/main" xmlns="" w="9525">
                 <a:solidFill>
                   <a:schemeClr val="tx1"/>
                 </a:solidFill>
@@ -5857,7 +5985,7 @@
               </a14:hiddenLine>
             </a:ext>
             <a:ext uri="{AF507438-7753-43E0-B8FC-AC1667EBCBE1}">
-              <a14:hiddenEffects xmlns="" xmlns:a14="http://schemas.microsoft.com/office/drawing/2010/main">
+              <a14:hiddenEffects xmlns:a14="http://schemas.microsoft.com/office/drawing/2010/main" xmlns="">
                 <a:effectLst>
                   <a:outerShdw dist="35921" dir="2700000" algn="ctr" rotWithShape="0">
                     <a:schemeClr val="bg2"/>
@@ -5871,7 +5999,7 @@
     </p:spTree>
     <p:extLst>
       <p:ext uri="{BB962C8B-B14F-4D97-AF65-F5344CB8AC3E}">
-        <p14:creationId xmlns="" xmlns:p14="http://schemas.microsoft.com/office/powerpoint/2010/main" val="139512369"/>
+        <p14:creationId xmlns:p14="http://schemas.microsoft.com/office/powerpoint/2010/main" xmlns="" val="139512369"/>
       </p:ext>
     </p:extLst>
   </p:cSld>
@@ -5963,7 +6091,7 @@
           <a:blip r:embed="rId2" cstate="print">
             <a:extLst>
               <a:ext uri="{28A0092B-C50C-407E-A947-70E740481C1C}">
-                <a14:useLocalDpi xmlns="" xmlns:a14="http://schemas.microsoft.com/office/drawing/2010/main" val="0"/>
+                <a14:useLocalDpi xmlns:a14="http://schemas.microsoft.com/office/drawing/2010/main" xmlns="" val="0"/>
               </a:ext>
             </a:extLst>
           </a:blip>
@@ -5987,14 +6115,14 @@
           <a:effectLst/>
           <a:extLst>
             <a:ext uri="{909E8E84-426E-40DD-AFC4-6F175D3DCCD1}">
-              <a14:hiddenFill xmlns="" xmlns:a14="http://schemas.microsoft.com/office/drawing/2010/main">
+              <a14:hiddenFill xmlns:a14="http://schemas.microsoft.com/office/drawing/2010/main" xmlns="">
                 <a:solidFill>
                   <a:schemeClr val="accent1"/>
                 </a:solidFill>
               </a14:hiddenFill>
             </a:ext>
             <a:ext uri="{91240B29-F687-4F45-9708-019B960494DF}">
-              <a14:hiddenLine xmlns="" xmlns:a14="http://schemas.microsoft.com/office/drawing/2010/main" w="9525">
+              <a14:hiddenLine xmlns:a14="http://schemas.microsoft.com/office/drawing/2010/main" xmlns="" w="9525">
                 <a:solidFill>
                   <a:schemeClr val="tx1"/>
                 </a:solidFill>
@@ -6004,7 +6132,7 @@
               </a14:hiddenLine>
             </a:ext>
             <a:ext uri="{AF507438-7753-43E0-B8FC-AC1667EBCBE1}">
-              <a14:hiddenEffects xmlns="" xmlns:a14="http://schemas.microsoft.com/office/drawing/2010/main">
+              <a14:hiddenEffects xmlns:a14="http://schemas.microsoft.com/office/drawing/2010/main" xmlns="">
                 <a:effectLst>
                   <a:outerShdw dist="35921" dir="2700000" algn="ctr" rotWithShape="0">
                     <a:schemeClr val="bg2"/>
@@ -6027,7 +6155,7 @@
           <a:blip r:embed="rId3" cstate="print">
             <a:extLst>
               <a:ext uri="{28A0092B-C50C-407E-A947-70E740481C1C}">
-                <a14:useLocalDpi xmlns="" xmlns:a14="http://schemas.microsoft.com/office/drawing/2010/main" val="0"/>
+                <a14:useLocalDpi xmlns:a14="http://schemas.microsoft.com/office/drawing/2010/main" xmlns="" val="0"/>
               </a:ext>
             </a:extLst>
           </a:blip>
@@ -6051,14 +6179,14 @@
           <a:effectLst/>
           <a:extLst>
             <a:ext uri="{909E8E84-426E-40DD-AFC4-6F175D3DCCD1}">
-              <a14:hiddenFill xmlns="" xmlns:a14="http://schemas.microsoft.com/office/drawing/2010/main">
+              <a14:hiddenFill xmlns:a14="http://schemas.microsoft.com/office/drawing/2010/main" xmlns="">
                 <a:solidFill>
                   <a:schemeClr val="accent1"/>
                 </a:solidFill>
               </a14:hiddenFill>
             </a:ext>
             <a:ext uri="{91240B29-F687-4F45-9708-019B960494DF}">
-              <a14:hiddenLine xmlns="" xmlns:a14="http://schemas.microsoft.com/office/drawing/2010/main" w="9525">
+              <a14:hiddenLine xmlns:a14="http://schemas.microsoft.com/office/drawing/2010/main" xmlns="" w="9525">
                 <a:solidFill>
                   <a:schemeClr val="tx1"/>
                 </a:solidFill>
@@ -6068,7 +6196,7 @@
               </a14:hiddenLine>
             </a:ext>
             <a:ext uri="{AF507438-7753-43E0-B8FC-AC1667EBCBE1}">
-              <a14:hiddenEffects xmlns="" xmlns:a14="http://schemas.microsoft.com/office/drawing/2010/main">
+              <a14:hiddenEffects xmlns:a14="http://schemas.microsoft.com/office/drawing/2010/main" xmlns="">
                 <a:effectLst>
                   <a:outerShdw dist="35921" dir="2700000" algn="ctr" rotWithShape="0">
                     <a:schemeClr val="bg2"/>
@@ -6082,7 +6210,7 @@
     </p:spTree>
     <p:extLst>
       <p:ext uri="{BB962C8B-B14F-4D97-AF65-F5344CB8AC3E}">
-        <p14:creationId xmlns="" xmlns:p14="http://schemas.microsoft.com/office/powerpoint/2010/main" val="2245152277"/>
+        <p14:creationId xmlns:p14="http://schemas.microsoft.com/office/powerpoint/2010/main" xmlns="" val="2245152277"/>
       </p:ext>
     </p:extLst>
   </p:cSld>
@@ -6185,7 +6313,7 @@
     </p:spTree>
     <p:extLst>
       <p:ext uri="{BB962C8B-B14F-4D97-AF65-F5344CB8AC3E}">
-        <p14:creationId xmlns="" xmlns:p14="http://schemas.microsoft.com/office/powerpoint/2010/main" val="3959217640"/>
+        <p14:creationId xmlns:p14="http://schemas.microsoft.com/office/powerpoint/2010/main" xmlns="" val="3959217640"/>
       </p:ext>
     </p:extLst>
   </p:cSld>
@@ -6365,11 +6493,7 @@
           <a:p>
             <a:r>
               <a:rPr lang="nl-BE" dirty="0" smtClean="0"/>
-              <a:t>v</a:t>
-            </a:r>
-            <a:r>
-              <a:rPr lang="nl-BE" dirty="0" smtClean="0"/>
-              <a:t>1</a:t>
+              <a:t>v1</a:t>
             </a:r>
           </a:p>
         </p:txBody>
@@ -6407,7 +6531,7 @@
     </p:spTree>
     <p:extLst>
       <p:ext uri="{BB962C8B-B14F-4D97-AF65-F5344CB8AC3E}">
-        <p14:creationId xmlns="" xmlns:p14="http://schemas.microsoft.com/office/powerpoint/2010/main" val="98984593"/>
+        <p14:creationId xmlns:p14="http://schemas.microsoft.com/office/powerpoint/2010/main" xmlns="" val="98984593"/>
       </p:ext>
     </p:extLst>
   </p:cSld>

</xml_diff>

<commit_message>
v3 added to presentation
</commit_message>
<xml_diff>
--- a/presentation/LAK Dataset Visualization - v2.pptx
+++ b/presentation/LAK Dataset Visualization - v2.pptx
@@ -5,7 +5,7 @@
     <p:sldMasterId id="2147483648" r:id="rId1"/>
   </p:sldMasterIdLst>
   <p:notesMasterIdLst>
-    <p:notesMasterId r:id="rId16"/>
+    <p:notesMasterId r:id="rId17"/>
   </p:notesMasterIdLst>
   <p:sldIdLst>
     <p:sldId id="256" r:id="rId2"/>
@@ -22,6 +22,7 @@
     <p:sldId id="265" r:id="rId13"/>
     <p:sldId id="266" r:id="rId14"/>
     <p:sldId id="271" r:id="rId15"/>
+    <p:sldId id="272" r:id="rId16"/>
   </p:sldIdLst>
   <p:sldSz cx="9144000" cy="6858000" type="screen4x3"/>
   <p:notesSz cx="6858000" cy="9144000"/>
@@ -375,7 +376,7 @@
     </p:spTree>
     <p:extLst>
       <p:ext uri="{BB962C8B-B14F-4D97-AF65-F5344CB8AC3E}">
-        <p14:creationId xmlns:p14="http://schemas.microsoft.com/office/powerpoint/2010/main" xmlns="" val="476566289"/>
+        <p14:creationId xmlns="" xmlns:p14="http://schemas.microsoft.com/office/powerpoint/2010/main" val="476566289"/>
       </p:ext>
     </p:extLst>
   </p:cSld>
@@ -601,7 +602,7 @@
     </p:spTree>
     <p:extLst>
       <p:ext uri="{BB962C8B-B14F-4D97-AF65-F5344CB8AC3E}">
-        <p14:creationId xmlns:p14="http://schemas.microsoft.com/office/powerpoint/2010/main" xmlns="" val="234455060"/>
+        <p14:creationId xmlns="" xmlns:p14="http://schemas.microsoft.com/office/powerpoint/2010/main" val="234455060"/>
       </p:ext>
     </p:extLst>
   </p:cSld>
@@ -750,7 +751,7 @@
     </p:spTree>
     <p:extLst>
       <p:ext uri="{BB962C8B-B14F-4D97-AF65-F5344CB8AC3E}">
-        <p14:creationId xmlns:p14="http://schemas.microsoft.com/office/powerpoint/2010/main" xmlns="" val="130345716"/>
+        <p14:creationId xmlns="" xmlns:p14="http://schemas.microsoft.com/office/powerpoint/2010/main" val="130345716"/>
       </p:ext>
     </p:extLst>
   </p:cSld>
@@ -994,7 +995,7 @@
     </p:spTree>
     <p:extLst>
       <p:ext uri="{BB962C8B-B14F-4D97-AF65-F5344CB8AC3E}">
-        <p14:creationId xmlns:p14="http://schemas.microsoft.com/office/powerpoint/2010/main" xmlns="" val="1991621647"/>
+        <p14:creationId xmlns="" xmlns:p14="http://schemas.microsoft.com/office/powerpoint/2010/main" val="1991621647"/>
       </p:ext>
     </p:extLst>
   </p:cSld>
@@ -1166,7 +1167,7 @@
     </p:spTree>
     <p:extLst>
       <p:ext uri="{BB962C8B-B14F-4D97-AF65-F5344CB8AC3E}">
-        <p14:creationId xmlns:p14="http://schemas.microsoft.com/office/powerpoint/2010/main" xmlns="" val="2011108903"/>
+        <p14:creationId xmlns="" xmlns:p14="http://schemas.microsoft.com/office/powerpoint/2010/main" val="2011108903"/>
       </p:ext>
     </p:extLst>
   </p:cSld>
@@ -1348,7 +1349,7 @@
     </p:spTree>
     <p:extLst>
       <p:ext uri="{BB962C8B-B14F-4D97-AF65-F5344CB8AC3E}">
-        <p14:creationId xmlns:p14="http://schemas.microsoft.com/office/powerpoint/2010/main" xmlns="" val="2728416370"/>
+        <p14:creationId xmlns="" xmlns:p14="http://schemas.microsoft.com/office/powerpoint/2010/main" val="2728416370"/>
       </p:ext>
     </p:extLst>
   </p:cSld>
@@ -1520,7 +1521,7 @@
     </p:spTree>
     <p:extLst>
       <p:ext uri="{BB962C8B-B14F-4D97-AF65-F5344CB8AC3E}">
-        <p14:creationId xmlns:p14="http://schemas.microsoft.com/office/powerpoint/2010/main" xmlns="" val="528057498"/>
+        <p14:creationId xmlns="" xmlns:p14="http://schemas.microsoft.com/office/powerpoint/2010/main" val="528057498"/>
       </p:ext>
     </p:extLst>
   </p:cSld>
@@ -1768,7 +1769,7 @@
     </p:spTree>
     <p:extLst>
       <p:ext uri="{BB962C8B-B14F-4D97-AF65-F5344CB8AC3E}">
-        <p14:creationId xmlns:p14="http://schemas.microsoft.com/office/powerpoint/2010/main" xmlns="" val="2370346862"/>
+        <p14:creationId xmlns="" xmlns:p14="http://schemas.microsoft.com/office/powerpoint/2010/main" val="2370346862"/>
       </p:ext>
     </p:extLst>
   </p:cSld>
@@ -2058,7 +2059,7 @@
     </p:spTree>
     <p:extLst>
       <p:ext uri="{BB962C8B-B14F-4D97-AF65-F5344CB8AC3E}">
-        <p14:creationId xmlns:p14="http://schemas.microsoft.com/office/powerpoint/2010/main" xmlns="" val="2795977544"/>
+        <p14:creationId xmlns="" xmlns:p14="http://schemas.microsoft.com/office/powerpoint/2010/main" val="2795977544"/>
       </p:ext>
     </p:extLst>
   </p:cSld>
@@ -2482,7 +2483,7 @@
     </p:spTree>
     <p:extLst>
       <p:ext uri="{BB962C8B-B14F-4D97-AF65-F5344CB8AC3E}">
-        <p14:creationId xmlns:p14="http://schemas.microsoft.com/office/powerpoint/2010/main" xmlns="" val="1434580930"/>
+        <p14:creationId xmlns="" xmlns:p14="http://schemas.microsoft.com/office/powerpoint/2010/main" val="1434580930"/>
       </p:ext>
     </p:extLst>
   </p:cSld>
@@ -2602,7 +2603,7 @@
     </p:spTree>
     <p:extLst>
       <p:ext uri="{BB962C8B-B14F-4D97-AF65-F5344CB8AC3E}">
-        <p14:creationId xmlns:p14="http://schemas.microsoft.com/office/powerpoint/2010/main" xmlns="" val="3970465546"/>
+        <p14:creationId xmlns="" xmlns:p14="http://schemas.microsoft.com/office/powerpoint/2010/main" val="3970465546"/>
       </p:ext>
     </p:extLst>
   </p:cSld>
@@ -2699,7 +2700,7 @@
     </p:spTree>
     <p:extLst>
       <p:ext uri="{BB962C8B-B14F-4D97-AF65-F5344CB8AC3E}">
-        <p14:creationId xmlns:p14="http://schemas.microsoft.com/office/powerpoint/2010/main" xmlns="" val="3891936300"/>
+        <p14:creationId xmlns="" xmlns:p14="http://schemas.microsoft.com/office/powerpoint/2010/main" val="3891936300"/>
       </p:ext>
     </p:extLst>
   </p:cSld>
@@ -2978,7 +2979,7 @@
     </p:spTree>
     <p:extLst>
       <p:ext uri="{BB962C8B-B14F-4D97-AF65-F5344CB8AC3E}">
-        <p14:creationId xmlns:p14="http://schemas.microsoft.com/office/powerpoint/2010/main" xmlns="" val="2949125007"/>
+        <p14:creationId xmlns="" xmlns:p14="http://schemas.microsoft.com/office/powerpoint/2010/main" val="2949125007"/>
       </p:ext>
     </p:extLst>
   </p:cSld>
@@ -3233,7 +3234,7 @@
     </p:spTree>
     <p:extLst>
       <p:ext uri="{BB962C8B-B14F-4D97-AF65-F5344CB8AC3E}">
-        <p14:creationId xmlns:p14="http://schemas.microsoft.com/office/powerpoint/2010/main" xmlns="" val="1068751909"/>
+        <p14:creationId xmlns="" xmlns:p14="http://schemas.microsoft.com/office/powerpoint/2010/main" val="1068751909"/>
       </p:ext>
     </p:extLst>
   </p:cSld>
@@ -3484,7 +3485,7 @@
     </p:spTree>
     <p:extLst>
       <p:ext uri="{BB962C8B-B14F-4D97-AF65-F5344CB8AC3E}">
-        <p14:creationId xmlns:p14="http://schemas.microsoft.com/office/powerpoint/2010/main" xmlns="" val="1722780671"/>
+        <p14:creationId xmlns="" xmlns:p14="http://schemas.microsoft.com/office/powerpoint/2010/main" val="1722780671"/>
       </p:ext>
     </p:extLst>
   </p:cSld>
@@ -3887,14 +3888,14 @@
           <a:effectLst/>
           <a:extLst>
             <a:ext uri="{909E8E84-426E-40DD-AFC4-6F175D3DCCD1}">
-              <a14:hiddenFill xmlns:a14="http://schemas.microsoft.com/office/drawing/2010/main" xmlns="">
+              <a14:hiddenFill xmlns="" xmlns:a14="http://schemas.microsoft.com/office/drawing/2010/main">
                 <a:solidFill>
                   <a:schemeClr val="accent1"/>
                 </a:solidFill>
               </a14:hiddenFill>
             </a:ext>
             <a:ext uri="{91240B29-F687-4F45-9708-019B960494DF}">
-              <a14:hiddenLine xmlns:a14="http://schemas.microsoft.com/office/drawing/2010/main" xmlns="" w="9525">
+              <a14:hiddenLine xmlns="" xmlns:a14="http://schemas.microsoft.com/office/drawing/2010/main" w="9525">
                 <a:solidFill>
                   <a:schemeClr val="tx1"/>
                 </a:solidFill>
@@ -3904,7 +3905,7 @@
               </a14:hiddenLine>
             </a:ext>
             <a:ext uri="{AF507438-7753-43E0-B8FC-AC1667EBCBE1}">
-              <a14:hiddenEffects xmlns:a14="http://schemas.microsoft.com/office/drawing/2010/main" xmlns="">
+              <a14:hiddenEffects xmlns="" xmlns:a14="http://schemas.microsoft.com/office/drawing/2010/main">
                 <a:effectLst>
                   <a:outerShdw dist="35921" dir="2700000" algn="ctr" rotWithShape="0">
                     <a:schemeClr val="bg2"/>
@@ -3927,7 +3928,7 @@
           <a:blip r:embed="rId3" cstate="print">
             <a:extLst>
               <a:ext uri="{28A0092B-C50C-407E-A947-70E740481C1C}">
-                <a14:useLocalDpi xmlns:a14="http://schemas.microsoft.com/office/drawing/2010/main" xmlns="" val="0"/>
+                <a14:useLocalDpi xmlns="" xmlns:a14="http://schemas.microsoft.com/office/drawing/2010/main" val="0"/>
               </a:ext>
             </a:extLst>
           </a:blip>
@@ -3951,14 +3952,14 @@
           <a:effectLst/>
           <a:extLst>
             <a:ext uri="{909E8E84-426E-40DD-AFC4-6F175D3DCCD1}">
-              <a14:hiddenFill xmlns:a14="http://schemas.microsoft.com/office/drawing/2010/main" xmlns="">
+              <a14:hiddenFill xmlns="" xmlns:a14="http://schemas.microsoft.com/office/drawing/2010/main">
                 <a:solidFill>
                   <a:schemeClr val="accent1"/>
                 </a:solidFill>
               </a14:hiddenFill>
             </a:ext>
             <a:ext uri="{91240B29-F687-4F45-9708-019B960494DF}">
-              <a14:hiddenLine xmlns:a14="http://schemas.microsoft.com/office/drawing/2010/main" xmlns="" w="9525">
+              <a14:hiddenLine xmlns="" xmlns:a14="http://schemas.microsoft.com/office/drawing/2010/main" w="9525">
                 <a:solidFill>
                   <a:schemeClr val="tx1"/>
                 </a:solidFill>
@@ -3968,7 +3969,7 @@
               </a14:hiddenLine>
             </a:ext>
             <a:ext uri="{AF507438-7753-43E0-B8FC-AC1667EBCBE1}">
-              <a14:hiddenEffects xmlns:a14="http://schemas.microsoft.com/office/drawing/2010/main" xmlns="">
+              <a14:hiddenEffects xmlns="" xmlns:a14="http://schemas.microsoft.com/office/drawing/2010/main">
                 <a:effectLst>
                   <a:outerShdw dist="35921" dir="2700000" algn="ctr" rotWithShape="0">
                     <a:schemeClr val="bg2"/>
@@ -3991,7 +3992,7 @@
           <a:blip r:embed="rId4" cstate="print">
             <a:extLst>
               <a:ext uri="{28A0092B-C50C-407E-A947-70E740481C1C}">
-                <a14:useLocalDpi xmlns:a14="http://schemas.microsoft.com/office/drawing/2010/main" xmlns="" val="0"/>
+                <a14:useLocalDpi xmlns="" xmlns:a14="http://schemas.microsoft.com/office/drawing/2010/main" val="0"/>
               </a:ext>
             </a:extLst>
           </a:blip>
@@ -4015,14 +4016,14 @@
           <a:effectLst/>
           <a:extLst>
             <a:ext uri="{909E8E84-426E-40DD-AFC4-6F175D3DCCD1}">
-              <a14:hiddenFill xmlns:a14="http://schemas.microsoft.com/office/drawing/2010/main" xmlns="">
+              <a14:hiddenFill xmlns="" xmlns:a14="http://schemas.microsoft.com/office/drawing/2010/main">
                 <a:solidFill>
                   <a:schemeClr val="accent1"/>
                 </a:solidFill>
               </a14:hiddenFill>
             </a:ext>
             <a:ext uri="{91240B29-F687-4F45-9708-019B960494DF}">
-              <a14:hiddenLine xmlns:a14="http://schemas.microsoft.com/office/drawing/2010/main" xmlns="" w="9525">
+              <a14:hiddenLine xmlns="" xmlns:a14="http://schemas.microsoft.com/office/drawing/2010/main" w="9525">
                 <a:solidFill>
                   <a:schemeClr val="tx1"/>
                 </a:solidFill>
@@ -4032,7 +4033,7 @@
               </a14:hiddenLine>
             </a:ext>
             <a:ext uri="{AF507438-7753-43E0-B8FC-AC1667EBCBE1}">
-              <a14:hiddenEffects xmlns:a14="http://schemas.microsoft.com/office/drawing/2010/main" xmlns="">
+              <a14:hiddenEffects xmlns="" xmlns:a14="http://schemas.microsoft.com/office/drawing/2010/main">
                 <a:effectLst>
                   <a:outerShdw dist="35921" dir="2700000" algn="ctr" rotWithShape="0">
                     <a:schemeClr val="bg2"/>
@@ -4046,7 +4047,7 @@
     </p:spTree>
     <p:extLst>
       <p:ext uri="{BB962C8B-B14F-4D97-AF65-F5344CB8AC3E}">
-        <p14:creationId xmlns:p14="http://schemas.microsoft.com/office/powerpoint/2010/main" xmlns="" val="2600589044"/>
+        <p14:creationId xmlns="" xmlns:p14="http://schemas.microsoft.com/office/powerpoint/2010/main" val="2600589044"/>
       </p:ext>
     </p:extLst>
   </p:cSld>
@@ -4176,7 +4177,7 @@
           <a:blip r:embed="rId2" cstate="print">
             <a:extLst>
               <a:ext uri="{28A0092B-C50C-407E-A947-70E740481C1C}">
-                <a14:useLocalDpi xmlns:a14="http://schemas.microsoft.com/office/drawing/2010/main" xmlns="" val="0"/>
+                <a14:useLocalDpi xmlns="" xmlns:a14="http://schemas.microsoft.com/office/drawing/2010/main" val="0"/>
               </a:ext>
             </a:extLst>
           </a:blip>
@@ -4200,14 +4201,14 @@
           <a:effectLst/>
           <a:extLst>
             <a:ext uri="{909E8E84-426E-40DD-AFC4-6F175D3DCCD1}">
-              <a14:hiddenFill xmlns:a14="http://schemas.microsoft.com/office/drawing/2010/main" xmlns="">
+              <a14:hiddenFill xmlns="" xmlns:a14="http://schemas.microsoft.com/office/drawing/2010/main">
                 <a:solidFill>
                   <a:schemeClr val="accent1"/>
                 </a:solidFill>
               </a14:hiddenFill>
             </a:ext>
             <a:ext uri="{91240B29-F687-4F45-9708-019B960494DF}">
-              <a14:hiddenLine xmlns:a14="http://schemas.microsoft.com/office/drawing/2010/main" xmlns="" w="9525">
+              <a14:hiddenLine xmlns="" xmlns:a14="http://schemas.microsoft.com/office/drawing/2010/main" w="9525">
                 <a:solidFill>
                   <a:schemeClr val="tx1"/>
                 </a:solidFill>
@@ -4217,7 +4218,7 @@
               </a14:hiddenLine>
             </a:ext>
             <a:ext uri="{AF507438-7753-43E0-B8FC-AC1667EBCBE1}">
-              <a14:hiddenEffects xmlns:a14="http://schemas.microsoft.com/office/drawing/2010/main" xmlns="">
+              <a14:hiddenEffects xmlns="" xmlns:a14="http://schemas.microsoft.com/office/drawing/2010/main">
                 <a:effectLst>
                   <a:outerShdw dist="35921" dir="2700000" algn="ctr" rotWithShape="0">
                     <a:schemeClr val="bg2"/>
@@ -4240,7 +4241,7 @@
           <a:blip r:embed="rId3" cstate="print">
             <a:extLst>
               <a:ext uri="{28A0092B-C50C-407E-A947-70E740481C1C}">
-                <a14:useLocalDpi xmlns:a14="http://schemas.microsoft.com/office/drawing/2010/main" xmlns="" val="0"/>
+                <a14:useLocalDpi xmlns="" xmlns:a14="http://schemas.microsoft.com/office/drawing/2010/main" val="0"/>
               </a:ext>
             </a:extLst>
           </a:blip>
@@ -4262,14 +4263,14 @@
           <a:effectLst/>
           <a:extLst>
             <a:ext uri="{909E8E84-426E-40DD-AFC4-6F175D3DCCD1}">
-              <a14:hiddenFill xmlns:a14="http://schemas.microsoft.com/office/drawing/2010/main" xmlns="">
+              <a14:hiddenFill xmlns="" xmlns:a14="http://schemas.microsoft.com/office/drawing/2010/main">
                 <a:solidFill>
                   <a:schemeClr val="accent1"/>
                 </a:solidFill>
               </a14:hiddenFill>
             </a:ext>
             <a:ext uri="{91240B29-F687-4F45-9708-019B960494DF}">
-              <a14:hiddenLine xmlns:a14="http://schemas.microsoft.com/office/drawing/2010/main" xmlns="" w="9525">
+              <a14:hiddenLine xmlns="" xmlns:a14="http://schemas.microsoft.com/office/drawing/2010/main" w="9525">
                 <a:solidFill>
                   <a:schemeClr val="tx1"/>
                 </a:solidFill>
@@ -4279,7 +4280,7 @@
               </a14:hiddenLine>
             </a:ext>
             <a:ext uri="{AF507438-7753-43E0-B8FC-AC1667EBCBE1}">
-              <a14:hiddenEffects xmlns:a14="http://schemas.microsoft.com/office/drawing/2010/main" xmlns="">
+              <a14:hiddenEffects xmlns="" xmlns:a14="http://schemas.microsoft.com/office/drawing/2010/main">
                 <a:effectLst>
                   <a:outerShdw dist="35921" dir="2700000" algn="ctr" rotWithShape="0">
                     <a:schemeClr val="bg2"/>
@@ -4365,7 +4366,7 @@
           <a:blip r:embed="rId4" cstate="print">
             <a:extLst>
               <a:ext uri="{28A0092B-C50C-407E-A947-70E740481C1C}">
-                <a14:useLocalDpi xmlns:a14="http://schemas.microsoft.com/office/drawing/2010/main" xmlns="" val="0"/>
+                <a14:useLocalDpi xmlns="" xmlns:a14="http://schemas.microsoft.com/office/drawing/2010/main" val="0"/>
               </a:ext>
             </a:extLst>
           </a:blip>
@@ -4389,14 +4390,14 @@
           <a:effectLst/>
           <a:extLst>
             <a:ext uri="{909E8E84-426E-40DD-AFC4-6F175D3DCCD1}">
-              <a14:hiddenFill xmlns:a14="http://schemas.microsoft.com/office/drawing/2010/main" xmlns="">
+              <a14:hiddenFill xmlns="" xmlns:a14="http://schemas.microsoft.com/office/drawing/2010/main">
                 <a:solidFill>
                   <a:schemeClr val="accent1"/>
                 </a:solidFill>
               </a14:hiddenFill>
             </a:ext>
             <a:ext uri="{91240B29-F687-4F45-9708-019B960494DF}">
-              <a14:hiddenLine xmlns:a14="http://schemas.microsoft.com/office/drawing/2010/main" xmlns="" w="9525">
+              <a14:hiddenLine xmlns="" xmlns:a14="http://schemas.microsoft.com/office/drawing/2010/main" w="9525">
                 <a:solidFill>
                   <a:schemeClr val="tx1"/>
                 </a:solidFill>
@@ -4406,7 +4407,7 @@
               </a14:hiddenLine>
             </a:ext>
             <a:ext uri="{AF507438-7753-43E0-B8FC-AC1667EBCBE1}">
-              <a14:hiddenEffects xmlns:a14="http://schemas.microsoft.com/office/drawing/2010/main" xmlns="">
+              <a14:hiddenEffects xmlns="" xmlns:a14="http://schemas.microsoft.com/office/drawing/2010/main">
                 <a:effectLst>
                   <a:outerShdw dist="35921" dir="2700000" algn="ctr" rotWithShape="0">
                     <a:schemeClr val="bg2"/>
@@ -4420,7 +4421,7 @@
     </p:spTree>
     <p:extLst>
       <p:ext uri="{BB962C8B-B14F-4D97-AF65-F5344CB8AC3E}">
-        <p14:creationId xmlns:p14="http://schemas.microsoft.com/office/powerpoint/2010/main" xmlns="" val="3235389205"/>
+        <p14:creationId xmlns="" xmlns:p14="http://schemas.microsoft.com/office/powerpoint/2010/main" val="3235389205"/>
       </p:ext>
     </p:extLst>
   </p:cSld>
@@ -4506,14 +4507,14 @@
           <a:effectLst/>
           <a:extLst>
             <a:ext uri="{909E8E84-426E-40DD-AFC4-6F175D3DCCD1}">
-              <a14:hiddenFill xmlns:a14="http://schemas.microsoft.com/office/drawing/2010/main" xmlns="">
+              <a14:hiddenFill xmlns="" xmlns:a14="http://schemas.microsoft.com/office/drawing/2010/main">
                 <a:solidFill>
                   <a:schemeClr val="accent1"/>
                 </a:solidFill>
               </a14:hiddenFill>
             </a:ext>
             <a:ext uri="{91240B29-F687-4F45-9708-019B960494DF}">
-              <a14:hiddenLine xmlns:a14="http://schemas.microsoft.com/office/drawing/2010/main" xmlns="" w="9525">
+              <a14:hiddenLine xmlns="" xmlns:a14="http://schemas.microsoft.com/office/drawing/2010/main" w="9525">
                 <a:solidFill>
                   <a:schemeClr val="tx1"/>
                 </a:solidFill>
@@ -4523,7 +4524,7 @@
               </a14:hiddenLine>
             </a:ext>
             <a:ext uri="{AF507438-7753-43E0-B8FC-AC1667EBCBE1}">
-              <a14:hiddenEffects xmlns:a14="http://schemas.microsoft.com/office/drawing/2010/main" xmlns="">
+              <a14:hiddenEffects xmlns="" xmlns:a14="http://schemas.microsoft.com/office/drawing/2010/main">
                 <a:effectLst>
                   <a:outerShdw dist="35921" dir="2700000" algn="ctr" rotWithShape="0">
                     <a:schemeClr val="bg2"/>
@@ -4546,7 +4547,7 @@
           <a:blip r:embed="rId3" cstate="print">
             <a:extLst>
               <a:ext uri="{28A0092B-C50C-407E-A947-70E740481C1C}">
-                <a14:useLocalDpi xmlns:a14="http://schemas.microsoft.com/office/drawing/2010/main" xmlns="" val="0"/>
+                <a14:useLocalDpi xmlns="" xmlns:a14="http://schemas.microsoft.com/office/drawing/2010/main" val="0"/>
               </a:ext>
             </a:extLst>
           </a:blip>
@@ -4570,14 +4571,14 @@
           <a:effectLst/>
           <a:extLst>
             <a:ext uri="{909E8E84-426E-40DD-AFC4-6F175D3DCCD1}">
-              <a14:hiddenFill xmlns:a14="http://schemas.microsoft.com/office/drawing/2010/main" xmlns="">
+              <a14:hiddenFill xmlns="" xmlns:a14="http://schemas.microsoft.com/office/drawing/2010/main">
                 <a:solidFill>
                   <a:schemeClr val="accent1"/>
                 </a:solidFill>
               </a14:hiddenFill>
             </a:ext>
             <a:ext uri="{91240B29-F687-4F45-9708-019B960494DF}">
-              <a14:hiddenLine xmlns:a14="http://schemas.microsoft.com/office/drawing/2010/main" xmlns="" w="9525">
+              <a14:hiddenLine xmlns="" xmlns:a14="http://schemas.microsoft.com/office/drawing/2010/main" w="9525">
                 <a:solidFill>
                   <a:schemeClr val="tx1"/>
                 </a:solidFill>
@@ -4587,7 +4588,7 @@
               </a14:hiddenLine>
             </a:ext>
             <a:ext uri="{AF507438-7753-43E0-B8FC-AC1667EBCBE1}">
-              <a14:hiddenEffects xmlns:a14="http://schemas.microsoft.com/office/drawing/2010/main" xmlns="">
+              <a14:hiddenEffects xmlns="" xmlns:a14="http://schemas.microsoft.com/office/drawing/2010/main">
                 <a:effectLst>
                   <a:outerShdw dist="35921" dir="2700000" algn="ctr" rotWithShape="0">
                     <a:schemeClr val="bg2"/>
@@ -4610,7 +4611,7 @@
           <a:blip r:embed="rId4" cstate="print">
             <a:extLst>
               <a:ext uri="{28A0092B-C50C-407E-A947-70E740481C1C}">
-                <a14:useLocalDpi xmlns:a14="http://schemas.microsoft.com/office/drawing/2010/main" xmlns="" val="0"/>
+                <a14:useLocalDpi xmlns="" xmlns:a14="http://schemas.microsoft.com/office/drawing/2010/main" val="0"/>
               </a:ext>
             </a:extLst>
           </a:blip>
@@ -4634,14 +4635,14 @@
           <a:effectLst/>
           <a:extLst>
             <a:ext uri="{909E8E84-426E-40DD-AFC4-6F175D3DCCD1}">
-              <a14:hiddenFill xmlns:a14="http://schemas.microsoft.com/office/drawing/2010/main" xmlns="">
+              <a14:hiddenFill xmlns="" xmlns:a14="http://schemas.microsoft.com/office/drawing/2010/main">
                 <a:solidFill>
                   <a:schemeClr val="accent1"/>
                 </a:solidFill>
               </a14:hiddenFill>
             </a:ext>
             <a:ext uri="{91240B29-F687-4F45-9708-019B960494DF}">
-              <a14:hiddenLine xmlns:a14="http://schemas.microsoft.com/office/drawing/2010/main" xmlns="" w="9525">
+              <a14:hiddenLine xmlns="" xmlns:a14="http://schemas.microsoft.com/office/drawing/2010/main" w="9525">
                 <a:solidFill>
                   <a:schemeClr val="tx1"/>
                 </a:solidFill>
@@ -4651,7 +4652,7 @@
               </a14:hiddenLine>
             </a:ext>
             <a:ext uri="{AF507438-7753-43E0-B8FC-AC1667EBCBE1}">
-              <a14:hiddenEffects xmlns:a14="http://schemas.microsoft.com/office/drawing/2010/main" xmlns="">
+              <a14:hiddenEffects xmlns="" xmlns:a14="http://schemas.microsoft.com/office/drawing/2010/main">
                 <a:effectLst>
                   <a:outerShdw dist="35921" dir="2700000" algn="ctr" rotWithShape="0">
                     <a:schemeClr val="bg2"/>
@@ -4665,7 +4666,7 @@
     </p:spTree>
     <p:extLst>
       <p:ext uri="{BB962C8B-B14F-4D97-AF65-F5344CB8AC3E}">
-        <p14:creationId xmlns:p14="http://schemas.microsoft.com/office/powerpoint/2010/main" xmlns="" val="424393772"/>
+        <p14:creationId xmlns="" xmlns:p14="http://schemas.microsoft.com/office/powerpoint/2010/main" val="424393772"/>
       </p:ext>
     </p:extLst>
   </p:cSld>
@@ -4774,7 +4775,7 @@
           <a:blip r:embed="rId2" cstate="print">
             <a:extLst>
               <a:ext uri="{28A0092B-C50C-407E-A947-70E740481C1C}">
-                <a14:useLocalDpi xmlns:a14="http://schemas.microsoft.com/office/drawing/2010/main" xmlns="" val="0"/>
+                <a14:useLocalDpi xmlns="" xmlns:a14="http://schemas.microsoft.com/office/drawing/2010/main" val="0"/>
               </a:ext>
             </a:extLst>
           </a:blip>
@@ -4794,7 +4795,7 @@
           <a:noFill/>
           <a:extLst>
             <a:ext uri="{909E8E84-426E-40DD-AFC4-6F175D3DCCD1}">
-              <a14:hiddenFill xmlns:a14="http://schemas.microsoft.com/office/drawing/2010/main" xmlns="">
+              <a14:hiddenFill xmlns="" xmlns:a14="http://schemas.microsoft.com/office/drawing/2010/main">
                 <a:solidFill>
                   <a:srgbClr val="FFFFFF"/>
                 </a:solidFill>
@@ -4806,7 +4807,7 @@
     </p:spTree>
     <p:extLst>
       <p:ext uri="{BB962C8B-B14F-4D97-AF65-F5344CB8AC3E}">
-        <p14:creationId xmlns:p14="http://schemas.microsoft.com/office/powerpoint/2010/main" xmlns="" val="4123940548"/>
+        <p14:creationId xmlns="" xmlns:p14="http://schemas.microsoft.com/office/powerpoint/2010/main" val="4123940548"/>
       </p:ext>
     </p:extLst>
   </p:cSld>
@@ -4945,7 +4946,7 @@
             </a:clrChange>
             <a:extLst>
               <a:ext uri="{28A0092B-C50C-407E-A947-70E740481C1C}">
-                <a14:useLocalDpi xmlns:a14="http://schemas.microsoft.com/office/drawing/2010/main" xmlns="" val="0"/>
+                <a14:useLocalDpi xmlns="" xmlns:a14="http://schemas.microsoft.com/office/drawing/2010/main" val="0"/>
               </a:ext>
             </a:extLst>
           </a:blip>
@@ -4969,14 +4970,14 @@
           <a:effectLst/>
           <a:extLst>
             <a:ext uri="{909E8E84-426E-40DD-AFC4-6F175D3DCCD1}">
-              <a14:hiddenFill xmlns:a14="http://schemas.microsoft.com/office/drawing/2010/main" xmlns="">
+              <a14:hiddenFill xmlns="" xmlns:a14="http://schemas.microsoft.com/office/drawing/2010/main">
                 <a:solidFill>
                   <a:schemeClr val="accent1"/>
                 </a:solidFill>
               </a14:hiddenFill>
             </a:ext>
             <a:ext uri="{91240B29-F687-4F45-9708-019B960494DF}">
-              <a14:hiddenLine xmlns:a14="http://schemas.microsoft.com/office/drawing/2010/main" xmlns="" w="9525">
+              <a14:hiddenLine xmlns="" xmlns:a14="http://schemas.microsoft.com/office/drawing/2010/main" w="9525">
                 <a:solidFill>
                   <a:schemeClr val="tx1"/>
                 </a:solidFill>
@@ -4986,7 +4987,7 @@
               </a14:hiddenLine>
             </a:ext>
             <a:ext uri="{AF507438-7753-43E0-B8FC-AC1667EBCBE1}">
-              <a14:hiddenEffects xmlns:a14="http://schemas.microsoft.com/office/drawing/2010/main" xmlns="">
+              <a14:hiddenEffects xmlns="" xmlns:a14="http://schemas.microsoft.com/office/drawing/2010/main">
                 <a:effectLst>
                   <a:outerShdw dist="35921" dir="2700000" algn="ctr" rotWithShape="0">
                     <a:schemeClr val="bg2"/>
@@ -5000,7 +5001,7 @@
     </p:spTree>
     <p:extLst>
       <p:ext uri="{BB962C8B-B14F-4D97-AF65-F5344CB8AC3E}">
-        <p14:creationId xmlns:p14="http://schemas.microsoft.com/office/powerpoint/2010/main" xmlns="" val="2515279697"/>
+        <p14:creationId xmlns="" xmlns:p14="http://schemas.microsoft.com/office/powerpoint/2010/main" val="2515279697"/>
       </p:ext>
     </p:extLst>
   </p:cSld>
@@ -5053,11 +5054,7 @@
           <a:p>
             <a:r>
               <a:rPr lang="nl-BE" dirty="0" err="1" smtClean="0"/>
-              <a:t>Evaluatio</a:t>
-            </a:r>
-            <a:r>
-              <a:rPr lang="nl-BE" dirty="0" err="1" smtClean="0"/>
-              <a:t>n</a:t>
+              <a:t>Evaluation</a:t>
             </a:r>
             <a:endParaRPr lang="nl-BE" dirty="0"/>
           </a:p>
@@ -5090,7 +5087,6 @@
               <a:rPr lang="nl-BE" dirty="0" smtClean="0"/>
               <a:t>84.17</a:t>
             </a:r>
-            <a:endParaRPr lang="nl-BE" dirty="0" smtClean="0"/>
           </a:p>
           <a:p>
             <a:endParaRPr lang="nl-BE" dirty="0" smtClean="0"/>
@@ -5171,6 +5167,127 @@
 </p:sld>
 </file>
 
+<file path=ppt/slides/slide15.xml><?xml version="1.0" encoding="utf-8"?>
+<p:sld xmlns:a="http://schemas.openxmlformats.org/drawingml/2006/main" xmlns:r="http://schemas.openxmlformats.org/officeDocument/2006/relationships" xmlns:p="http://schemas.openxmlformats.org/presentationml/2006/main">
+  <p:cSld>
+    <p:spTree>
+      <p:nvGrpSpPr>
+        <p:cNvPr id="1" name=""/>
+        <p:cNvGrpSpPr/>
+        <p:nvPr/>
+      </p:nvGrpSpPr>
+      <p:grpSpPr>
+        <a:xfrm>
+          <a:off x="0" y="0"/>
+          <a:ext cx="0" cy="0"/>
+          <a:chOff x="0" y="0"/>
+          <a:chExt cx="0" cy="0"/>
+        </a:xfrm>
+      </p:grpSpPr>
+      <p:sp>
+        <p:nvSpPr>
+          <p:cNvPr id="2" name="Title 1"/>
+          <p:cNvSpPr>
+            <a:spLocks noGrp="1"/>
+          </p:cNvSpPr>
+          <p:nvPr>
+            <p:ph type="title"/>
+          </p:nvPr>
+        </p:nvSpPr>
+        <p:spPr/>
+        <p:txBody>
+          <a:bodyPr>
+            <a:normAutofit/>
+          </a:bodyPr>
+          <a:lstStyle/>
+          <a:p>
+            <a:r>
+              <a:rPr lang="en-US" dirty="0" smtClean="0"/>
+              <a:t>Changes in </a:t>
+            </a:r>
+            <a:r>
+              <a:rPr lang="en-US" dirty="0" smtClean="0"/>
+              <a:t>v3 </a:t>
+            </a:r>
+            <a:r>
+              <a:rPr lang="en-US" dirty="0" smtClean="0"/>
+              <a:t>– </a:t>
+            </a:r>
+            <a:r>
+              <a:rPr lang="en-US" dirty="0" err="1" smtClean="0"/>
+              <a:t>Barchartmap</a:t>
+            </a:r>
+            <a:endParaRPr lang="en-US" dirty="0"/>
+          </a:p>
+        </p:txBody>
+      </p:sp>
+      <p:sp>
+        <p:nvSpPr>
+          <p:cNvPr id="3" name="Content Placeholder 2"/>
+          <p:cNvSpPr>
+            <a:spLocks noGrp="1"/>
+          </p:cNvSpPr>
+          <p:nvPr>
+            <p:ph idx="1"/>
+          </p:nvPr>
+        </p:nvSpPr>
+        <p:spPr>
+          <a:xfrm>
+            <a:off x="457200" y="1600201"/>
+            <a:ext cx="8003232" cy="4133056"/>
+          </a:xfrm>
+        </p:spPr>
+        <p:txBody>
+          <a:bodyPr>
+            <a:normAutofit/>
+          </a:bodyPr>
+          <a:lstStyle/>
+          <a:p>
+            <a:r>
+              <a:rPr lang="en-US" dirty="0" smtClean="0"/>
+              <a:t>Added required user interaction</a:t>
+            </a:r>
+          </a:p>
+          <a:p>
+            <a:pPr lvl="1"/>
+            <a:r>
+              <a:rPr lang="en-US" dirty="0" smtClean="0"/>
+              <a:t>When a bar chart is clicked, the map pans to the corresponding organization/country</a:t>
+            </a:r>
+          </a:p>
+          <a:p>
+            <a:pPr lvl="1"/>
+            <a:r>
+              <a:rPr lang="en-US" dirty="0" smtClean="0"/>
+              <a:t>When an organization is clicked, the bar charts panel scrolls to the corresponding bar chart</a:t>
+            </a:r>
+            <a:endParaRPr lang="en-US" dirty="0" smtClean="0"/>
+          </a:p>
+          <a:p>
+            <a:endParaRPr lang="en-US" sz="2800" dirty="0" smtClean="0"/>
+          </a:p>
+        </p:txBody>
+      </p:sp>
+    </p:spTree>
+    <p:extLst>
+      <p:ext uri="{BB962C8B-B14F-4D97-AF65-F5344CB8AC3E}">
+        <p14:creationId xmlns="" xmlns:p14="http://schemas.microsoft.com/office/powerpoint/2010/main" val="98984593"/>
+      </p:ext>
+    </p:extLst>
+  </p:cSld>
+  <p:clrMapOvr>
+    <a:masterClrMapping/>
+  </p:clrMapOvr>
+  <p:timing>
+    <p:tnLst>
+      <p:par>
+        <p:cTn id="1" dur="indefinite" restart="never" nodeType="tmRoot"/>
+      </p:par>
+    </p:tnLst>
+  </p:timing>
+</p:sld>
+</file>
+
 <file path=ppt/slides/slide2.xml><?xml version="1.0" encoding="utf-8"?>
 <p:sld xmlns:a="http://schemas.openxmlformats.org/drawingml/2006/main" xmlns:r="http://schemas.openxmlformats.org/officeDocument/2006/relationships" xmlns:p="http://schemas.openxmlformats.org/presentationml/2006/main">
   <p:cSld>
@@ -5303,7 +5420,7 @@
     </p:spTree>
     <p:extLst>
       <p:ext uri="{BB962C8B-B14F-4D97-AF65-F5344CB8AC3E}">
-        <p14:creationId xmlns:p14="http://schemas.microsoft.com/office/powerpoint/2010/main" xmlns="" val="816144802"/>
+        <p14:creationId xmlns="" xmlns:p14="http://schemas.microsoft.com/office/powerpoint/2010/main" val="816144802"/>
       </p:ext>
     </p:extLst>
   </p:cSld>
@@ -5448,7 +5565,7 @@
           <a:blip r:embed="rId2" cstate="print">
             <a:extLst>
               <a:ext uri="{28A0092B-C50C-407E-A947-70E740481C1C}">
-                <a14:useLocalDpi xmlns:a14="http://schemas.microsoft.com/office/drawing/2010/main" xmlns="" val="0"/>
+                <a14:useLocalDpi xmlns="" xmlns:a14="http://schemas.microsoft.com/office/drawing/2010/main" val="0"/>
               </a:ext>
             </a:extLst>
           </a:blip>
@@ -5468,7 +5585,7 @@
           <a:noFill/>
           <a:extLst>
             <a:ext uri="{909E8E84-426E-40DD-AFC4-6F175D3DCCD1}">
-              <a14:hiddenFill xmlns:a14="http://schemas.microsoft.com/office/drawing/2010/main" xmlns="">
+              <a14:hiddenFill xmlns="" xmlns:a14="http://schemas.microsoft.com/office/drawing/2010/main">
                 <a:solidFill>
                   <a:srgbClr val="FFFFFF"/>
                 </a:solidFill>
@@ -5480,7 +5597,7 @@
     </p:spTree>
     <p:extLst>
       <p:ext uri="{BB962C8B-B14F-4D97-AF65-F5344CB8AC3E}">
-        <p14:creationId xmlns:p14="http://schemas.microsoft.com/office/powerpoint/2010/main" xmlns="" val="941338223"/>
+        <p14:creationId xmlns="" xmlns:p14="http://schemas.microsoft.com/office/powerpoint/2010/main" val="941338223"/>
       </p:ext>
     </p:extLst>
   </p:cSld>
@@ -5627,14 +5744,14 @@
           <a:effectLst/>
           <a:extLst>
             <a:ext uri="{909E8E84-426E-40DD-AFC4-6F175D3DCCD1}">
-              <a14:hiddenFill xmlns:a14="http://schemas.microsoft.com/office/drawing/2010/main" xmlns="">
+              <a14:hiddenFill xmlns="" xmlns:a14="http://schemas.microsoft.com/office/drawing/2010/main">
                 <a:solidFill>
                   <a:schemeClr val="accent1"/>
                 </a:solidFill>
               </a14:hiddenFill>
             </a:ext>
             <a:ext uri="{91240B29-F687-4F45-9708-019B960494DF}">
-              <a14:hiddenLine xmlns:a14="http://schemas.microsoft.com/office/drawing/2010/main" xmlns="" w="9525">
+              <a14:hiddenLine xmlns="" xmlns:a14="http://schemas.microsoft.com/office/drawing/2010/main" w="9525">
                 <a:solidFill>
                   <a:schemeClr val="tx1"/>
                 </a:solidFill>
@@ -5644,7 +5761,7 @@
               </a14:hiddenLine>
             </a:ext>
             <a:ext uri="{AF507438-7753-43E0-B8FC-AC1667EBCBE1}">
-              <a14:hiddenEffects xmlns:a14="http://schemas.microsoft.com/office/drawing/2010/main" xmlns="">
+              <a14:hiddenEffects xmlns="" xmlns:a14="http://schemas.microsoft.com/office/drawing/2010/main">
                 <a:effectLst>
                   <a:outerShdw dist="35921" dir="2700000" algn="ctr" rotWithShape="0">
                     <a:schemeClr val="bg2"/>
@@ -5658,7 +5775,7 @@
     </p:spTree>
     <p:extLst>
       <p:ext uri="{BB962C8B-B14F-4D97-AF65-F5344CB8AC3E}">
-        <p14:creationId xmlns:p14="http://schemas.microsoft.com/office/powerpoint/2010/main" xmlns="" val="2521051551"/>
+        <p14:creationId xmlns="" xmlns:p14="http://schemas.microsoft.com/office/powerpoint/2010/main" val="2521051551"/>
       </p:ext>
     </p:extLst>
   </p:cSld>
@@ -5780,7 +5897,7 @@
           <a:blip r:embed="rId3" cstate="print">
             <a:extLst>
               <a:ext uri="{28A0092B-C50C-407E-A947-70E740481C1C}">
-                <a14:useLocalDpi xmlns:a14="http://schemas.microsoft.com/office/drawing/2010/main" xmlns="" val="0"/>
+                <a14:useLocalDpi xmlns="" xmlns:a14="http://schemas.microsoft.com/office/drawing/2010/main" val="0"/>
               </a:ext>
             </a:extLst>
           </a:blip>
@@ -5804,14 +5921,14 @@
           <a:effectLst/>
           <a:extLst>
             <a:ext uri="{909E8E84-426E-40DD-AFC4-6F175D3DCCD1}">
-              <a14:hiddenFill xmlns:a14="http://schemas.microsoft.com/office/drawing/2010/main" xmlns="">
+              <a14:hiddenFill xmlns="" xmlns:a14="http://schemas.microsoft.com/office/drawing/2010/main">
                 <a:solidFill>
                   <a:schemeClr val="accent1"/>
                 </a:solidFill>
               </a14:hiddenFill>
             </a:ext>
             <a:ext uri="{91240B29-F687-4F45-9708-019B960494DF}">
-              <a14:hiddenLine xmlns:a14="http://schemas.microsoft.com/office/drawing/2010/main" xmlns="" w="9525">
+              <a14:hiddenLine xmlns="" xmlns:a14="http://schemas.microsoft.com/office/drawing/2010/main" w="9525">
                 <a:solidFill>
                   <a:schemeClr val="tx1"/>
                 </a:solidFill>
@@ -5821,7 +5938,7 @@
               </a14:hiddenLine>
             </a:ext>
             <a:ext uri="{AF507438-7753-43E0-B8FC-AC1667EBCBE1}">
-              <a14:hiddenEffects xmlns:a14="http://schemas.microsoft.com/office/drawing/2010/main" xmlns="">
+              <a14:hiddenEffects xmlns="" xmlns:a14="http://schemas.microsoft.com/office/drawing/2010/main">
                 <a:effectLst>
                   <a:outerShdw dist="35921" dir="2700000" algn="ctr" rotWithShape="0">
                     <a:schemeClr val="bg2"/>
@@ -5835,7 +5952,7 @@
     </p:spTree>
     <p:extLst>
       <p:ext uri="{BB962C8B-B14F-4D97-AF65-F5344CB8AC3E}">
-        <p14:creationId xmlns:p14="http://schemas.microsoft.com/office/powerpoint/2010/main" xmlns="" val="2485197033"/>
+        <p14:creationId xmlns="" xmlns:p14="http://schemas.microsoft.com/office/powerpoint/2010/main" val="2485197033"/>
       </p:ext>
     </p:extLst>
   </p:cSld>
@@ -5944,7 +6061,7 @@
           <a:blip r:embed="rId2" cstate="print">
             <a:extLst>
               <a:ext uri="{28A0092B-C50C-407E-A947-70E740481C1C}">
-                <a14:useLocalDpi xmlns:a14="http://schemas.microsoft.com/office/drawing/2010/main" xmlns="" val="0"/>
+                <a14:useLocalDpi xmlns="" xmlns:a14="http://schemas.microsoft.com/office/drawing/2010/main" val="0"/>
               </a:ext>
             </a:extLst>
           </a:blip>
@@ -5968,14 +6085,14 @@
           <a:effectLst/>
           <a:extLst>
             <a:ext uri="{909E8E84-426E-40DD-AFC4-6F175D3DCCD1}">
-              <a14:hiddenFill xmlns:a14="http://schemas.microsoft.com/office/drawing/2010/main" xmlns="">
+              <a14:hiddenFill xmlns="" xmlns:a14="http://schemas.microsoft.com/office/drawing/2010/main">
                 <a:solidFill>
                   <a:schemeClr val="accent1"/>
                 </a:solidFill>
               </a14:hiddenFill>
             </a:ext>
             <a:ext uri="{91240B29-F687-4F45-9708-019B960494DF}">
-              <a14:hiddenLine xmlns:a14="http://schemas.microsoft.com/office/drawing/2010/main" xmlns="" w="9525">
+              <a14:hiddenLine xmlns="" xmlns:a14="http://schemas.microsoft.com/office/drawing/2010/main" w="9525">
                 <a:solidFill>
                   <a:schemeClr val="tx1"/>
                 </a:solidFill>
@@ -5985,7 +6102,7 @@
               </a14:hiddenLine>
             </a:ext>
             <a:ext uri="{AF507438-7753-43E0-B8FC-AC1667EBCBE1}">
-              <a14:hiddenEffects xmlns:a14="http://schemas.microsoft.com/office/drawing/2010/main" xmlns="">
+              <a14:hiddenEffects xmlns="" xmlns:a14="http://schemas.microsoft.com/office/drawing/2010/main">
                 <a:effectLst>
                   <a:outerShdw dist="35921" dir="2700000" algn="ctr" rotWithShape="0">
                     <a:schemeClr val="bg2"/>
@@ -5999,7 +6116,7 @@
     </p:spTree>
     <p:extLst>
       <p:ext uri="{BB962C8B-B14F-4D97-AF65-F5344CB8AC3E}">
-        <p14:creationId xmlns:p14="http://schemas.microsoft.com/office/powerpoint/2010/main" xmlns="" val="139512369"/>
+        <p14:creationId xmlns="" xmlns:p14="http://schemas.microsoft.com/office/powerpoint/2010/main" val="139512369"/>
       </p:ext>
     </p:extLst>
   </p:cSld>
@@ -6091,7 +6208,7 @@
           <a:blip r:embed="rId2" cstate="print">
             <a:extLst>
               <a:ext uri="{28A0092B-C50C-407E-A947-70E740481C1C}">
-                <a14:useLocalDpi xmlns:a14="http://schemas.microsoft.com/office/drawing/2010/main" xmlns="" val="0"/>
+                <a14:useLocalDpi xmlns="" xmlns:a14="http://schemas.microsoft.com/office/drawing/2010/main" val="0"/>
               </a:ext>
             </a:extLst>
           </a:blip>
@@ -6115,14 +6232,14 @@
           <a:effectLst/>
           <a:extLst>
             <a:ext uri="{909E8E84-426E-40DD-AFC4-6F175D3DCCD1}">
-              <a14:hiddenFill xmlns:a14="http://schemas.microsoft.com/office/drawing/2010/main" xmlns="">
+              <a14:hiddenFill xmlns="" xmlns:a14="http://schemas.microsoft.com/office/drawing/2010/main">
                 <a:solidFill>
                   <a:schemeClr val="accent1"/>
                 </a:solidFill>
               </a14:hiddenFill>
             </a:ext>
             <a:ext uri="{91240B29-F687-4F45-9708-019B960494DF}">
-              <a14:hiddenLine xmlns:a14="http://schemas.microsoft.com/office/drawing/2010/main" xmlns="" w="9525">
+              <a14:hiddenLine xmlns="" xmlns:a14="http://schemas.microsoft.com/office/drawing/2010/main" w="9525">
                 <a:solidFill>
                   <a:schemeClr val="tx1"/>
                 </a:solidFill>
@@ -6132,7 +6249,7 @@
               </a14:hiddenLine>
             </a:ext>
             <a:ext uri="{AF507438-7753-43E0-B8FC-AC1667EBCBE1}">
-              <a14:hiddenEffects xmlns:a14="http://schemas.microsoft.com/office/drawing/2010/main" xmlns="">
+              <a14:hiddenEffects xmlns="" xmlns:a14="http://schemas.microsoft.com/office/drawing/2010/main">
                 <a:effectLst>
                   <a:outerShdw dist="35921" dir="2700000" algn="ctr" rotWithShape="0">
                     <a:schemeClr val="bg2"/>
@@ -6155,7 +6272,7 @@
           <a:blip r:embed="rId3" cstate="print">
             <a:extLst>
               <a:ext uri="{28A0092B-C50C-407E-A947-70E740481C1C}">
-                <a14:useLocalDpi xmlns:a14="http://schemas.microsoft.com/office/drawing/2010/main" xmlns="" val="0"/>
+                <a14:useLocalDpi xmlns="" xmlns:a14="http://schemas.microsoft.com/office/drawing/2010/main" val="0"/>
               </a:ext>
             </a:extLst>
           </a:blip>
@@ -6179,14 +6296,14 @@
           <a:effectLst/>
           <a:extLst>
             <a:ext uri="{909E8E84-426E-40DD-AFC4-6F175D3DCCD1}">
-              <a14:hiddenFill xmlns:a14="http://schemas.microsoft.com/office/drawing/2010/main" xmlns="">
+              <a14:hiddenFill xmlns="" xmlns:a14="http://schemas.microsoft.com/office/drawing/2010/main">
                 <a:solidFill>
                   <a:schemeClr val="accent1"/>
                 </a:solidFill>
               </a14:hiddenFill>
             </a:ext>
             <a:ext uri="{91240B29-F687-4F45-9708-019B960494DF}">
-              <a14:hiddenLine xmlns:a14="http://schemas.microsoft.com/office/drawing/2010/main" xmlns="" w="9525">
+              <a14:hiddenLine xmlns="" xmlns:a14="http://schemas.microsoft.com/office/drawing/2010/main" w="9525">
                 <a:solidFill>
                   <a:schemeClr val="tx1"/>
                 </a:solidFill>
@@ -6196,7 +6313,7 @@
               </a14:hiddenLine>
             </a:ext>
             <a:ext uri="{AF507438-7753-43E0-B8FC-AC1667EBCBE1}">
-              <a14:hiddenEffects xmlns:a14="http://schemas.microsoft.com/office/drawing/2010/main" xmlns="">
+              <a14:hiddenEffects xmlns="" xmlns:a14="http://schemas.microsoft.com/office/drawing/2010/main">
                 <a:effectLst>
                   <a:outerShdw dist="35921" dir="2700000" algn="ctr" rotWithShape="0">
                     <a:schemeClr val="bg2"/>
@@ -6210,7 +6327,7 @@
     </p:spTree>
     <p:extLst>
       <p:ext uri="{BB962C8B-B14F-4D97-AF65-F5344CB8AC3E}">
-        <p14:creationId xmlns:p14="http://schemas.microsoft.com/office/powerpoint/2010/main" xmlns="" val="2245152277"/>
+        <p14:creationId xmlns="" xmlns:p14="http://schemas.microsoft.com/office/powerpoint/2010/main" val="2245152277"/>
       </p:ext>
     </p:extLst>
   </p:cSld>
@@ -6313,7 +6430,7 @@
     </p:spTree>
     <p:extLst>
       <p:ext uri="{BB962C8B-B14F-4D97-AF65-F5344CB8AC3E}">
-        <p14:creationId xmlns:p14="http://schemas.microsoft.com/office/powerpoint/2010/main" xmlns="" val="3959217640"/>
+        <p14:creationId xmlns="" xmlns:p14="http://schemas.microsoft.com/office/powerpoint/2010/main" val="3959217640"/>
       </p:ext>
     </p:extLst>
   </p:cSld>
@@ -6531,7 +6648,7 @@
     </p:spTree>
     <p:extLst>
       <p:ext uri="{BB962C8B-B14F-4D97-AF65-F5344CB8AC3E}">
-        <p14:creationId xmlns:p14="http://schemas.microsoft.com/office/powerpoint/2010/main" xmlns="" val="98984593"/>
+        <p14:creationId xmlns="" xmlns:p14="http://schemas.microsoft.com/office/powerpoint/2010/main" val="98984593"/>
       </p:ext>
     </p:extLst>
   </p:cSld>

</xml_diff>